<commit_message>
add local badge images, add docu
</commit_message>
<xml_diff>
--- a/docs/canvas-status-arc42-org.pptx
+++ b/docs/canvas-status-arc42-org.pptx
@@ -208,7 +208,7 @@
           <a:p>
             <a:fld id="{64B5F81B-5358-9847-9EB0-70E79DCD4415}" type="datetimeFigureOut">
               <a:rPr lang="de-DE" smtClean="0"/>
-              <a:t>22.11.23</a:t>
+              <a:t>27.11.23</a:t>
             </a:fld>
             <a:endParaRPr lang="de-DE"/>
           </a:p>
@@ -3085,7 +3085,7 @@
                   </a:schemeClr>
                 </a:solidFill>
               </a:rPr>
-              <a:t>display</a:t>
+              <a:t>show</a:t>
             </a:r>
             <a:r>
               <a:rPr lang="de-DE" sz="1400" dirty="0">
@@ -3107,6 +3107,28 @@
                   </a:schemeClr>
                 </a:solidFill>
               </a:rPr>
+              <a:t>detailed</a:t>
+            </a:r>
+            <a:r>
+              <a:rPr lang="de-DE" sz="1400" dirty="0">
+                <a:solidFill>
+                  <a:schemeClr val="tx1">
+                    <a:lumMod val="85000"/>
+                    <a:lumOff val="15000"/>
+                  </a:schemeClr>
+                </a:solidFill>
+              </a:rPr>
+              <a:t> </a:t>
+            </a:r>
+            <a:r>
+              <a:rPr lang="de-DE" sz="1400" dirty="0" err="1">
+                <a:solidFill>
+                  <a:schemeClr val="tx1">
+                    <a:lumMod val="85000"/>
+                    <a:lumOff val="15000"/>
+                  </a:schemeClr>
+                </a:solidFill>
+              </a:rPr>
               <a:t>statistics</a:t>
             </a:r>
             <a:r>
@@ -3129,7 +3151,277 @@
                   </a:schemeClr>
                 </a:solidFill>
               </a:rPr>
-              <a:t>table</a:t>
+              <a:t>for</a:t>
+            </a:r>
+            <a:r>
+              <a:rPr lang="de-DE" sz="1400" dirty="0">
+                <a:solidFill>
+                  <a:schemeClr val="tx1">
+                    <a:lumMod val="85000"/>
+                    <a:lumOff val="15000"/>
+                  </a:schemeClr>
+                </a:solidFill>
+              </a:rPr>
+              <a:t> </a:t>
+            </a:r>
+            <a:r>
+              <a:rPr lang="de-DE" sz="1400" dirty="0" err="1">
+                <a:solidFill>
+                  <a:schemeClr val="tx1">
+                    <a:lumMod val="85000"/>
+                    <a:lumOff val="15000"/>
+                  </a:schemeClr>
+                </a:solidFill>
+              </a:rPr>
+              <a:t>every</a:t>
+            </a:r>
+            <a:r>
+              <a:rPr lang="de-DE" sz="1400" dirty="0">
+                <a:solidFill>
+                  <a:schemeClr val="tx1">
+                    <a:lumMod val="85000"/>
+                    <a:lumOff val="15000"/>
+                  </a:schemeClr>
+                </a:solidFill>
+              </a:rPr>
+              <a:t> arc42 </a:t>
+            </a:r>
+            <a:r>
+              <a:rPr lang="de-DE" sz="1400" dirty="0" err="1">
+                <a:solidFill>
+                  <a:schemeClr val="tx1">
+                    <a:lumMod val="85000"/>
+                    <a:lumOff val="15000"/>
+                  </a:schemeClr>
+                </a:solidFill>
+              </a:rPr>
+              <a:t>website</a:t>
+            </a:r>
+            <a:r>
+              <a:rPr lang="de-DE" sz="1400" dirty="0">
+                <a:solidFill>
+                  <a:schemeClr val="tx1">
+                    <a:lumMod val="85000"/>
+                    <a:lumOff val="15000"/>
+                  </a:schemeClr>
+                </a:solidFill>
+              </a:rPr>
+              <a:t> (.de, .</a:t>
+            </a:r>
+            <a:r>
+              <a:rPr lang="de-DE" sz="1400" dirty="0" err="1">
+                <a:solidFill>
+                  <a:schemeClr val="tx1">
+                    <a:lumMod val="85000"/>
+                    <a:lumOff val="15000"/>
+                  </a:schemeClr>
+                </a:solidFill>
+              </a:rPr>
+              <a:t>org</a:t>
+            </a:r>
+            <a:r>
+              <a:rPr lang="de-DE" sz="1400" dirty="0">
+                <a:solidFill>
+                  <a:schemeClr val="tx1">
+                    <a:lumMod val="85000"/>
+                    <a:lumOff val="15000"/>
+                  </a:schemeClr>
+                </a:solidFill>
+              </a:rPr>
+              <a:t>, </a:t>
+            </a:r>
+            <a:r>
+              <a:rPr lang="de-DE" sz="1400" dirty="0" err="1">
+                <a:solidFill>
+                  <a:schemeClr val="tx1">
+                    <a:lumMod val="85000"/>
+                    <a:lumOff val="15000"/>
+                  </a:schemeClr>
+                </a:solidFill>
+              </a:rPr>
+              <a:t>docs</a:t>
+            </a:r>
+            <a:r>
+              <a:rPr lang="de-DE" sz="1400" dirty="0">
+                <a:solidFill>
+                  <a:schemeClr val="tx1">
+                    <a:lumMod val="85000"/>
+                    <a:lumOff val="15000"/>
+                  </a:schemeClr>
+                </a:solidFill>
+              </a:rPr>
+              <a:t>, </a:t>
+            </a:r>
+            <a:r>
+              <a:rPr lang="de-DE" sz="1400" dirty="0" err="1">
+                <a:solidFill>
+                  <a:schemeClr val="tx1">
+                    <a:lumMod val="85000"/>
+                    <a:lumOff val="15000"/>
+                  </a:schemeClr>
+                </a:solidFill>
+              </a:rPr>
+              <a:t>faq</a:t>
+            </a:r>
+            <a:r>
+              <a:rPr lang="de-DE" sz="1400" dirty="0">
+                <a:solidFill>
+                  <a:schemeClr val="tx1">
+                    <a:lumMod val="85000"/>
+                    <a:lumOff val="15000"/>
+                  </a:schemeClr>
+                </a:solidFill>
+              </a:rPr>
+              <a:t>, </a:t>
+            </a:r>
+            <a:r>
+              <a:rPr lang="de-DE" sz="1400" dirty="0" err="1">
+                <a:solidFill>
+                  <a:schemeClr val="tx1">
+                    <a:lumMod val="85000"/>
+                    <a:lumOff val="15000"/>
+                  </a:schemeClr>
+                </a:solidFill>
+              </a:rPr>
+              <a:t>canvas</a:t>
+            </a:r>
+            <a:r>
+              <a:rPr lang="de-DE" sz="1400" dirty="0">
+                <a:solidFill>
+                  <a:schemeClr val="tx1">
+                    <a:lumMod val="85000"/>
+                    <a:lumOff val="15000"/>
+                  </a:schemeClr>
+                </a:solidFill>
+              </a:rPr>
+              <a:t>, </a:t>
+            </a:r>
+            <a:r>
+              <a:rPr lang="de-DE" sz="1400" dirty="0" err="1">
+                <a:solidFill>
+                  <a:schemeClr val="tx1">
+                    <a:lumMod val="85000"/>
+                    <a:lumOff val="15000"/>
+                  </a:schemeClr>
+                </a:solidFill>
+              </a:rPr>
+              <a:t>quality</a:t>
+            </a:r>
+            <a:r>
+              <a:rPr lang="de-DE" sz="1400" dirty="0">
+                <a:solidFill>
+                  <a:schemeClr val="tx1">
+                    <a:lumMod val="85000"/>
+                    <a:lumOff val="15000"/>
+                  </a:schemeClr>
+                </a:solidFill>
+              </a:rPr>
+              <a:t> and </a:t>
+            </a:r>
+            <a:r>
+              <a:rPr lang="de-DE" sz="1400" dirty="0" err="1">
+                <a:solidFill>
+                  <a:schemeClr val="tx1">
+                    <a:lumMod val="85000"/>
+                    <a:lumOff val="15000"/>
+                  </a:schemeClr>
+                </a:solidFill>
+              </a:rPr>
+              <a:t>status</a:t>
+            </a:r>
+            <a:r>
+              <a:rPr lang="de-DE" sz="1400" dirty="0">
+                <a:solidFill>
+                  <a:schemeClr val="tx1">
+                    <a:lumMod val="85000"/>
+                    <a:lumOff val="15000"/>
+                  </a:schemeClr>
+                </a:solidFill>
+              </a:rPr>
+              <a:t>)</a:t>
+            </a:r>
+          </a:p>
+          <a:p>
+            <a:pPr marL="285750" indent="-285750">
+              <a:buFont typeface="Arial" panose="020B0604020202020204" pitchFamily="34" charset="0"/>
+              <a:buChar char="•"/>
+            </a:pPr>
+            <a:r>
+              <a:rPr lang="de-DE" sz="1400" dirty="0" err="1">
+                <a:solidFill>
+                  <a:schemeClr val="tx1">
+                    <a:lumMod val="85000"/>
+                    <a:lumOff val="15000"/>
+                  </a:schemeClr>
+                </a:solidFill>
+              </a:rPr>
+              <a:t>show</a:t>
+            </a:r>
+            <a:r>
+              <a:rPr lang="de-DE" sz="1400" dirty="0">
+                <a:solidFill>
+                  <a:schemeClr val="tx1">
+                    <a:lumMod val="85000"/>
+                    <a:lumOff val="15000"/>
+                  </a:schemeClr>
+                </a:solidFill>
+              </a:rPr>
+              <a:t> </a:t>
+            </a:r>
+            <a:r>
+              <a:rPr lang="de-DE" sz="1400" dirty="0" err="1">
+                <a:solidFill>
+                  <a:schemeClr val="tx1">
+                    <a:lumMod val="85000"/>
+                    <a:lumOff val="15000"/>
+                  </a:schemeClr>
+                </a:solidFill>
+              </a:rPr>
+              <a:t>issues</a:t>
+            </a:r>
+            <a:r>
+              <a:rPr lang="de-DE" sz="1400" dirty="0">
+                <a:solidFill>
+                  <a:schemeClr val="tx1">
+                    <a:lumMod val="85000"/>
+                    <a:lumOff val="15000"/>
+                  </a:schemeClr>
+                </a:solidFill>
+              </a:rPr>
+              <a:t>/</a:t>
+            </a:r>
+            <a:r>
+              <a:rPr lang="de-DE" sz="1400" dirty="0" err="1">
+                <a:solidFill>
+                  <a:schemeClr val="tx1">
+                    <a:lumMod val="85000"/>
+                    <a:lumOff val="15000"/>
+                  </a:schemeClr>
+                </a:solidFill>
+              </a:rPr>
+              <a:t>bug</a:t>
+            </a:r>
+            <a:r>
+              <a:rPr lang="de-DE" sz="1400" dirty="0">
+                <a:solidFill>
+                  <a:schemeClr val="tx1">
+                    <a:lumMod val="85000"/>
+                    <a:lumOff val="15000"/>
+                  </a:schemeClr>
+                </a:solidFill>
+              </a:rPr>
+              <a:t> </a:t>
+            </a:r>
+            <a:r>
+              <a:rPr lang="de-DE" sz="1400">
+                <a:solidFill>
+                  <a:schemeClr val="tx1">
+                    <a:lumMod val="85000"/>
+                    <a:lumOff val="15000"/>
+                  </a:schemeClr>
+                </a:solidFill>
+              </a:rPr>
+              <a:t>counters </a:t>
             </a:r>
             <a:endParaRPr lang="de-DE" sz="1400" dirty="0">
               <a:solidFill>
@@ -3139,276 +3431,6 @@
                 </a:schemeClr>
               </a:solidFill>
             </a:endParaRPr>
-          </a:p>
-          <a:p>
-            <a:pPr marL="285750" indent="-285750">
-              <a:buFont typeface="Arial" panose="020B0604020202020204" pitchFamily="34" charset="0"/>
-              <a:buChar char="•"/>
-            </a:pPr>
-            <a:r>
-              <a:rPr lang="de-DE" sz="1400" dirty="0" err="1">
-                <a:solidFill>
-                  <a:schemeClr val="tx1">
-                    <a:lumMod val="85000"/>
-                    <a:lumOff val="15000"/>
-                  </a:schemeClr>
-                </a:solidFill>
-              </a:rPr>
-              <a:t>show</a:t>
-            </a:r>
-            <a:r>
-              <a:rPr lang="de-DE" sz="1400" dirty="0">
-                <a:solidFill>
-                  <a:schemeClr val="tx1">
-                    <a:lumMod val="85000"/>
-                    <a:lumOff val="15000"/>
-                  </a:schemeClr>
-                </a:solidFill>
-              </a:rPr>
-              <a:t> </a:t>
-            </a:r>
-            <a:r>
-              <a:rPr lang="de-DE" sz="1400" dirty="0" err="1">
-                <a:solidFill>
-                  <a:schemeClr val="tx1">
-                    <a:lumMod val="85000"/>
-                    <a:lumOff val="15000"/>
-                  </a:schemeClr>
-                </a:solidFill>
-              </a:rPr>
-              <a:t>detailed</a:t>
-            </a:r>
-            <a:r>
-              <a:rPr lang="de-DE" sz="1400" dirty="0">
-                <a:solidFill>
-                  <a:schemeClr val="tx1">
-                    <a:lumMod val="85000"/>
-                    <a:lumOff val="15000"/>
-                  </a:schemeClr>
-                </a:solidFill>
-              </a:rPr>
-              <a:t> </a:t>
-            </a:r>
-            <a:r>
-              <a:rPr lang="de-DE" sz="1400" dirty="0" err="1">
-                <a:solidFill>
-                  <a:schemeClr val="tx1">
-                    <a:lumMod val="85000"/>
-                    <a:lumOff val="15000"/>
-                  </a:schemeClr>
-                </a:solidFill>
-              </a:rPr>
-              <a:t>statistics</a:t>
-            </a:r>
-            <a:r>
-              <a:rPr lang="de-DE" sz="1400" dirty="0">
-                <a:solidFill>
-                  <a:schemeClr val="tx1">
-                    <a:lumMod val="85000"/>
-                    <a:lumOff val="15000"/>
-                  </a:schemeClr>
-                </a:solidFill>
-              </a:rPr>
-              <a:t> </a:t>
-            </a:r>
-            <a:r>
-              <a:rPr lang="de-DE" sz="1400" dirty="0" err="1">
-                <a:solidFill>
-                  <a:schemeClr val="tx1">
-                    <a:lumMod val="85000"/>
-                    <a:lumOff val="15000"/>
-                  </a:schemeClr>
-                </a:solidFill>
-              </a:rPr>
-              <a:t>for</a:t>
-            </a:r>
-            <a:r>
-              <a:rPr lang="de-DE" sz="1400" dirty="0">
-                <a:solidFill>
-                  <a:schemeClr val="tx1">
-                    <a:lumMod val="85000"/>
-                    <a:lumOff val="15000"/>
-                  </a:schemeClr>
-                </a:solidFill>
-              </a:rPr>
-              <a:t> </a:t>
-            </a:r>
-            <a:r>
-              <a:rPr lang="de-DE" sz="1400" dirty="0" err="1">
-                <a:solidFill>
-                  <a:schemeClr val="tx1">
-                    <a:lumMod val="85000"/>
-                    <a:lumOff val="15000"/>
-                  </a:schemeClr>
-                </a:solidFill>
-              </a:rPr>
-              <a:t>every</a:t>
-            </a:r>
-            <a:r>
-              <a:rPr lang="de-DE" sz="1400" dirty="0">
-                <a:solidFill>
-                  <a:schemeClr val="tx1">
-                    <a:lumMod val="85000"/>
-                    <a:lumOff val="15000"/>
-                  </a:schemeClr>
-                </a:solidFill>
-              </a:rPr>
-              <a:t> arc42 </a:t>
-            </a:r>
-            <a:r>
-              <a:rPr lang="de-DE" sz="1400" dirty="0" err="1">
-                <a:solidFill>
-                  <a:schemeClr val="tx1">
-                    <a:lumMod val="85000"/>
-                    <a:lumOff val="15000"/>
-                  </a:schemeClr>
-                </a:solidFill>
-              </a:rPr>
-              <a:t>website</a:t>
-            </a:r>
-            <a:r>
-              <a:rPr lang="de-DE" sz="1400" dirty="0">
-                <a:solidFill>
-                  <a:schemeClr val="tx1">
-                    <a:lumMod val="85000"/>
-                    <a:lumOff val="15000"/>
-                  </a:schemeClr>
-                </a:solidFill>
-              </a:rPr>
-              <a:t> (.de, .</a:t>
-            </a:r>
-            <a:r>
-              <a:rPr lang="de-DE" sz="1400" dirty="0" err="1">
-                <a:solidFill>
-                  <a:schemeClr val="tx1">
-                    <a:lumMod val="85000"/>
-                    <a:lumOff val="15000"/>
-                  </a:schemeClr>
-                </a:solidFill>
-              </a:rPr>
-              <a:t>org</a:t>
-            </a:r>
-            <a:r>
-              <a:rPr lang="de-DE" sz="1400" dirty="0">
-                <a:solidFill>
-                  <a:schemeClr val="tx1">
-                    <a:lumMod val="85000"/>
-                    <a:lumOff val="15000"/>
-                  </a:schemeClr>
-                </a:solidFill>
-              </a:rPr>
-              <a:t>, </a:t>
-            </a:r>
-            <a:r>
-              <a:rPr lang="de-DE" sz="1400" dirty="0" err="1">
-                <a:solidFill>
-                  <a:schemeClr val="tx1">
-                    <a:lumMod val="85000"/>
-                    <a:lumOff val="15000"/>
-                  </a:schemeClr>
-                </a:solidFill>
-              </a:rPr>
-              <a:t>docs</a:t>
-            </a:r>
-            <a:r>
-              <a:rPr lang="de-DE" sz="1400" dirty="0">
-                <a:solidFill>
-                  <a:schemeClr val="tx1">
-                    <a:lumMod val="85000"/>
-                    <a:lumOff val="15000"/>
-                  </a:schemeClr>
-                </a:solidFill>
-              </a:rPr>
-              <a:t>, </a:t>
-            </a:r>
-            <a:r>
-              <a:rPr lang="de-DE" sz="1400" dirty="0" err="1">
-                <a:solidFill>
-                  <a:schemeClr val="tx1">
-                    <a:lumMod val="85000"/>
-                    <a:lumOff val="15000"/>
-                  </a:schemeClr>
-                </a:solidFill>
-              </a:rPr>
-              <a:t>faq</a:t>
-            </a:r>
-            <a:r>
-              <a:rPr lang="de-DE" sz="1400" dirty="0">
-                <a:solidFill>
-                  <a:schemeClr val="tx1">
-                    <a:lumMod val="85000"/>
-                    <a:lumOff val="15000"/>
-                  </a:schemeClr>
-                </a:solidFill>
-              </a:rPr>
-              <a:t>, </a:t>
-            </a:r>
-            <a:r>
-              <a:rPr lang="de-DE" sz="1400" dirty="0" err="1">
-                <a:solidFill>
-                  <a:schemeClr val="tx1">
-                    <a:lumMod val="85000"/>
-                    <a:lumOff val="15000"/>
-                  </a:schemeClr>
-                </a:solidFill>
-              </a:rPr>
-              <a:t>canvas</a:t>
-            </a:r>
-            <a:r>
-              <a:rPr lang="de-DE" sz="1400" dirty="0">
-                <a:solidFill>
-                  <a:schemeClr val="tx1">
-                    <a:lumMod val="85000"/>
-                    <a:lumOff val="15000"/>
-                  </a:schemeClr>
-                </a:solidFill>
-              </a:rPr>
-              <a:t>, </a:t>
-            </a:r>
-            <a:r>
-              <a:rPr lang="de-DE" sz="1400" dirty="0" err="1">
-                <a:solidFill>
-                  <a:schemeClr val="tx1">
-                    <a:lumMod val="85000"/>
-                    <a:lumOff val="15000"/>
-                  </a:schemeClr>
-                </a:solidFill>
-              </a:rPr>
-              <a:t>quality</a:t>
-            </a:r>
-            <a:r>
-              <a:rPr lang="de-DE" sz="1400" dirty="0">
-                <a:solidFill>
-                  <a:schemeClr val="tx1">
-                    <a:lumMod val="85000"/>
-                    <a:lumOff val="15000"/>
-                  </a:schemeClr>
-                </a:solidFill>
-              </a:rPr>
-              <a:t> and </a:t>
-            </a:r>
-            <a:r>
-              <a:rPr lang="de-DE" sz="1400" dirty="0" err="1">
-                <a:solidFill>
-                  <a:schemeClr val="tx1">
-                    <a:lumMod val="85000"/>
-                    <a:lumOff val="15000"/>
-                  </a:schemeClr>
-                </a:solidFill>
-              </a:rPr>
-              <a:t>status</a:t>
-            </a:r>
-            <a:r>
-              <a:rPr lang="de-DE" sz="1400" dirty="0">
-                <a:solidFill>
-                  <a:schemeClr val="tx1">
-                    <a:lumMod val="85000"/>
-                    <a:lumOff val="15000"/>
-                  </a:schemeClr>
-                </a:solidFill>
-              </a:rPr>
-              <a:t>) </a:t>
-            </a:r>
           </a:p>
         </p:txBody>
       </p:sp>
@@ -4187,6 +4209,31 @@
               </a:rPr>
               <a:t>template</a:t>
             </a:r>
+            <a:endParaRPr lang="de-DE" sz="1400" dirty="0">
+              <a:solidFill>
+                <a:schemeClr val="tx1">
+                  <a:lumMod val="85000"/>
+                  <a:lumOff val="15000"/>
+                </a:schemeClr>
+              </a:solidFill>
+            </a:endParaRPr>
+          </a:p>
+          <a:p>
+            <a:pPr marL="742950" lvl="1" indent="-285750">
+              <a:buFont typeface="Arial" panose="020B0604020202020204" pitchFamily="34" charset="0"/>
+              <a:buChar char="•"/>
+            </a:pPr>
+            <a:r>
+              <a:rPr lang="de-DE" sz="1400" dirty="0" err="1">
+                <a:solidFill>
+                  <a:schemeClr val="tx1">
+                    <a:lumMod val="85000"/>
+                    <a:lumOff val="15000"/>
+                  </a:schemeClr>
+                </a:solidFill>
+              </a:rPr>
+              <a:t>zerolog</a:t>
+            </a:r>
             <a:r>
               <a:rPr lang="de-DE" sz="1400" dirty="0">
                 <a:solidFill>
@@ -4377,72 +4424,6 @@
                 </a:solidFill>
               </a:rPr>
               <a:t>deployment</a:t>
-            </a:r>
-            <a:r>
-              <a:rPr lang="de-DE" sz="1400" dirty="0">
-                <a:solidFill>
-                  <a:schemeClr val="tx1">
-                    <a:lumMod val="85000"/>
-                    <a:lumOff val="15000"/>
-                  </a:schemeClr>
-                </a:solidFill>
-              </a:rPr>
-              <a:t> </a:t>
-            </a:r>
-            <a:r>
-              <a:rPr lang="de-DE" sz="1400" dirty="0" err="1">
-                <a:solidFill>
-                  <a:schemeClr val="tx1">
-                    <a:lumMod val="85000"/>
-                    <a:lumOff val="15000"/>
-                  </a:schemeClr>
-                </a:solidFill>
-              </a:rPr>
-              <a:t>of</a:t>
-            </a:r>
-            <a:r>
-              <a:rPr lang="de-DE" sz="1400" dirty="0">
-                <a:solidFill>
-                  <a:schemeClr val="tx1">
-                    <a:lumMod val="85000"/>
-                    <a:lumOff val="15000"/>
-                  </a:schemeClr>
-                </a:solidFill>
-              </a:rPr>
-              <a:t> </a:t>
-            </a:r>
-            <a:r>
-              <a:rPr lang="de-DE" sz="1400" dirty="0" err="1">
-                <a:solidFill>
-                  <a:schemeClr val="tx1">
-                    <a:lumMod val="85000"/>
-                    <a:lumOff val="15000"/>
-                  </a:schemeClr>
-                </a:solidFill>
-              </a:rPr>
-              <a:t>Golang</a:t>
-            </a:r>
-            <a:r>
-              <a:rPr lang="de-DE" sz="1400" dirty="0">
-                <a:solidFill>
-                  <a:schemeClr val="tx1">
-                    <a:lumMod val="85000"/>
-                    <a:lumOff val="15000"/>
-                  </a:schemeClr>
-                </a:solidFill>
-              </a:rPr>
-              <a:t> </a:t>
-            </a:r>
-            <a:r>
-              <a:rPr lang="de-DE" sz="1400" dirty="0" err="1">
-                <a:solidFill>
-                  <a:schemeClr val="tx1">
-                    <a:lumMod val="85000"/>
-                    <a:lumOff val="15000"/>
-                  </a:schemeClr>
-                </a:solidFill>
-              </a:rPr>
-              <a:t>service</a:t>
             </a:r>
             <a:endParaRPr lang="de-DE" sz="1400" dirty="0">
               <a:solidFill>
@@ -4674,6 +4655,69 @@
               </a:rPr>
               <a:t> </a:t>
             </a:r>
+            <a:r>
+              <a:rPr lang="de-DE" sz="1400" dirty="0" err="1">
+                <a:solidFill>
+                  <a:schemeClr val="tx1">
+                    <a:lumMod val="85000"/>
+                    <a:lumOff val="15000"/>
+                  </a:schemeClr>
+                </a:solidFill>
+              </a:rPr>
+              <a:t>unknown</a:t>
+            </a:r>
+            <a:r>
+              <a:rPr lang="de-DE" sz="1400" dirty="0">
+                <a:solidFill>
+                  <a:schemeClr val="tx1">
+                    <a:lumMod val="85000"/>
+                    <a:lumOff val="15000"/>
+                  </a:schemeClr>
+                </a:solidFill>
+              </a:rPr>
+              <a:t> </a:t>
+            </a:r>
+            <a:r>
+              <a:rPr lang="de-DE" sz="1400" dirty="0" err="1">
+                <a:solidFill>
+                  <a:schemeClr val="tx1">
+                    <a:lumMod val="85000"/>
+                    <a:lumOff val="15000"/>
+                  </a:schemeClr>
+                </a:solidFill>
+              </a:rPr>
+              <a:t>user</a:t>
+            </a:r>
+            <a:r>
+              <a:rPr lang="de-DE" sz="1400" dirty="0">
+                <a:solidFill>
+                  <a:schemeClr val="tx1">
+                    <a:lumMod val="85000"/>
+                    <a:lumOff val="15000"/>
+                  </a:schemeClr>
+                </a:solidFill>
+              </a:rPr>
+              <a:t> </a:t>
+            </a:r>
+            <a:r>
+              <a:rPr lang="de-DE" sz="1400" dirty="0" err="1">
+                <a:solidFill>
+                  <a:schemeClr val="tx1">
+                    <a:lumMod val="85000"/>
+                    <a:lumOff val="15000"/>
+                  </a:schemeClr>
+                </a:solidFill>
+              </a:rPr>
+              <a:t>expectation</a:t>
+            </a:r>
+            <a:endParaRPr lang="de-DE" sz="1400" dirty="0">
+              <a:solidFill>
+                <a:schemeClr val="tx1">
+                  <a:lumMod val="85000"/>
+                  <a:lumOff val="15000"/>
+                </a:schemeClr>
+              </a:solidFill>
+            </a:endParaRPr>
           </a:p>
         </p:txBody>
       </p:sp>
@@ -4817,7 +4861,7 @@
             </a:r>
             <a:r>
               <a:rPr lang="de-DE" sz="1400" dirty="0"/>
-              <a:t> (&gt;1200ms) </a:t>
+              <a:t> (&gt;3500ms) </a:t>
             </a:r>
           </a:p>
         </p:txBody>

</xml_diff>

<commit_message>
updated docu for svg badges
</commit_message>
<xml_diff>
--- a/docs/canvas-status-arc42-org.pptx
+++ b/docs/canvas-status-arc42-org.pptx
@@ -5,10 +5,11 @@
     <p:sldMasterId id="2147483648" r:id="rId1"/>
   </p:sldMasterIdLst>
   <p:notesMasterIdLst>
-    <p:notesMasterId r:id="rId3"/>
+    <p:notesMasterId r:id="rId4"/>
   </p:notesMasterIdLst>
   <p:sldIdLst>
     <p:sldId id="257" r:id="rId2"/>
+    <p:sldId id="258" r:id="rId3"/>
   </p:sldIdLst>
   <p:sldSz cx="12192000" cy="6858000"/>
   <p:notesSz cx="6858000" cy="9144000"/>
@@ -208,7 +209,7 @@
           <a:p>
             <a:fld id="{64B5F81B-5358-9847-9EB0-70E79DCD4415}" type="datetimeFigureOut">
               <a:rPr lang="de-DE" smtClean="0"/>
-              <a:t>27.11.23</a:t>
+              <a:t>09.12.23</a:t>
             </a:fld>
             <a:endParaRPr lang="de-DE"/>
           </a:p>
@@ -550,6 +551,90 @@
     <p:extLst>
       <p:ext uri="{BB962C8B-B14F-4D97-AF65-F5344CB8AC3E}">
         <p14:creationId xmlns:p14="http://schemas.microsoft.com/office/powerpoint/2010/main" val="1269616861"/>
+      </p:ext>
+    </p:extLst>
+  </p:cSld>
+  <p:clrMapOvr>
+    <a:masterClrMapping/>
+  </p:clrMapOvr>
+</p:notes>
+</file>
+
+<file path=ppt/notesSlides/notesSlide2.xml><?xml version="1.0" encoding="utf-8"?>
+<p:notes xmlns:a="http://schemas.openxmlformats.org/drawingml/2006/main" xmlns:r="http://schemas.openxmlformats.org/officeDocument/2006/relationships" xmlns:p="http://schemas.openxmlformats.org/presentationml/2006/main">
+  <p:cSld>
+    <p:spTree>
+      <p:nvGrpSpPr>
+        <p:cNvPr id="1" name=""/>
+        <p:cNvGrpSpPr/>
+        <p:nvPr/>
+      </p:nvGrpSpPr>
+      <p:grpSpPr>
+        <a:xfrm>
+          <a:off x="0" y="0"/>
+          <a:ext cx="0" cy="0"/>
+          <a:chOff x="0" y="0"/>
+          <a:chExt cx="0" cy="0"/>
+        </a:xfrm>
+      </p:grpSpPr>
+      <p:sp>
+        <p:nvSpPr>
+          <p:cNvPr id="2" name="Folienbildplatzhalter 1"/>
+          <p:cNvSpPr>
+            <a:spLocks noGrp="1" noRot="1" noChangeAspect="1"/>
+          </p:cNvSpPr>
+          <p:nvPr>
+            <p:ph type="sldImg"/>
+          </p:nvPr>
+        </p:nvSpPr>
+        <p:spPr/>
+      </p:sp>
+      <p:sp>
+        <p:nvSpPr>
+          <p:cNvPr id="3" name="Notizenplatzhalter 2"/>
+          <p:cNvSpPr>
+            <a:spLocks noGrp="1"/>
+          </p:cNvSpPr>
+          <p:nvPr>
+            <p:ph type="body" idx="1"/>
+          </p:nvPr>
+        </p:nvSpPr>
+        <p:spPr/>
+        <p:txBody>
+          <a:bodyPr/>
+          <a:lstStyle/>
+          <a:p>
+            <a:endParaRPr lang="de-DE" dirty="0"/>
+          </a:p>
+        </p:txBody>
+      </p:sp>
+      <p:sp>
+        <p:nvSpPr>
+          <p:cNvPr id="4" name="Foliennummernplatzhalter 3"/>
+          <p:cNvSpPr>
+            <a:spLocks noGrp="1"/>
+          </p:cNvSpPr>
+          <p:nvPr>
+            <p:ph type="sldNum" sz="quarter" idx="5"/>
+          </p:nvPr>
+        </p:nvSpPr>
+        <p:spPr/>
+        <p:txBody>
+          <a:bodyPr/>
+          <a:lstStyle/>
+          <a:p>
+            <a:fld id="{82AFD7F1-2F64-8147-99C4-F905666E053B}" type="slidenum">
+              <a:rPr lang="de-DE" smtClean="0"/>
+              <a:t>2</a:t>
+            </a:fld>
+            <a:endParaRPr lang="de-DE"/>
+          </a:p>
+        </p:txBody>
+      </p:sp>
+    </p:spTree>
+    <p:extLst>
+      <p:ext uri="{BB962C8B-B14F-4D97-AF65-F5344CB8AC3E}">
+        <p14:creationId xmlns:p14="http://schemas.microsoft.com/office/powerpoint/2010/main" val="4150240358"/>
       </p:ext>
     </p:extLst>
   </p:cSld>
@@ -2680,18 +2765,18 @@
                   </a:schemeClr>
                 </a:solidFill>
               </a:rPr>
-              <a:t>Show </a:t>
-            </a:r>
-            <a:r>
-              <a:rPr lang="de-DE" sz="1400" dirty="0" err="1">
-                <a:solidFill>
-                  <a:schemeClr val="tx1">
-                    <a:lumMod val="85000"/>
-                    <a:lumOff val="15000"/>
-                  </a:schemeClr>
-                </a:solidFill>
-              </a:rPr>
-              <a:t>detailed</a:t>
+              <a:t>Aggregate </a:t>
+            </a:r>
+            <a:r>
+              <a:rPr lang="de-DE" sz="1400" dirty="0" err="1">
+                <a:solidFill>
+                  <a:schemeClr val="tx1">
+                    <a:lumMod val="85000"/>
+                    <a:lumOff val="15000"/>
+                  </a:schemeClr>
+                </a:solidFill>
+              </a:rPr>
+              <a:t>usage</a:t>
             </a:r>
             <a:r>
               <a:rPr lang="de-DE" sz="1400" dirty="0">
@@ -2713,7 +2798,7 @@
                   </a:schemeClr>
                 </a:solidFill>
               </a:rPr>
-              <a:t>aggregate</a:t>
+              <a:t>data</a:t>
             </a:r>
             <a:r>
               <a:rPr lang="de-DE" sz="1400" dirty="0">
@@ -2735,7 +2820,7 @@
                   </a:schemeClr>
                 </a:solidFill>
               </a:rPr>
-              <a:t>statistics</a:t>
+              <a:t>for</a:t>
             </a:r>
             <a:r>
               <a:rPr lang="de-DE" sz="1400" dirty="0">
@@ -2757,28 +2842,6 @@
                   </a:schemeClr>
                 </a:solidFill>
               </a:rPr>
-              <a:t>of</a:t>
-            </a:r>
-            <a:r>
-              <a:rPr lang="de-DE" sz="1400" dirty="0">
-                <a:solidFill>
-                  <a:schemeClr val="tx1">
-                    <a:lumMod val="85000"/>
-                    <a:lumOff val="15000"/>
-                  </a:schemeClr>
-                </a:solidFill>
-              </a:rPr>
-              <a:t> </a:t>
-            </a:r>
-            <a:r>
-              <a:rPr lang="de-DE" sz="1400" dirty="0" err="1">
-                <a:solidFill>
-                  <a:schemeClr val="tx1">
-                    <a:lumMod val="85000"/>
-                    <a:lumOff val="15000"/>
-                  </a:schemeClr>
-                </a:solidFill>
-              </a:rPr>
               <a:t>visitors</a:t>
             </a:r>
             <a:r>
@@ -2790,6 +2853,50 @@
                   </a:schemeClr>
                 </a:solidFill>
               </a:rPr>
+              <a:t>, </a:t>
+            </a:r>
+            <a:r>
+              <a:rPr lang="de-DE" sz="1400" dirty="0" err="1">
+                <a:solidFill>
+                  <a:schemeClr val="tx1">
+                    <a:lumMod val="85000"/>
+                    <a:lumOff val="15000"/>
+                  </a:schemeClr>
+                </a:solidFill>
+              </a:rPr>
+              <a:t>pageviews</a:t>
+            </a:r>
+            <a:r>
+              <a:rPr lang="de-DE" sz="1400" dirty="0">
+                <a:solidFill>
+                  <a:schemeClr val="tx1">
+                    <a:lumMod val="85000"/>
+                    <a:lumOff val="15000"/>
+                  </a:schemeClr>
+                </a:solidFill>
+              </a:rPr>
+              <a:t>, </a:t>
+            </a:r>
+            <a:r>
+              <a:rPr lang="de-DE" sz="1400" dirty="0" err="1">
+                <a:solidFill>
+                  <a:schemeClr val="tx1">
+                    <a:lumMod val="85000"/>
+                    <a:lumOff val="15000"/>
+                  </a:schemeClr>
+                </a:solidFill>
+              </a:rPr>
+              <a:t>issues</a:t>
+            </a:r>
+            <a:r>
+              <a:rPr lang="de-DE" sz="1400" dirty="0">
+                <a:solidFill>
+                  <a:schemeClr val="tx1">
+                    <a:lumMod val="85000"/>
+                    <a:lumOff val="15000"/>
+                  </a:schemeClr>
+                </a:solidFill>
+              </a:rPr>
               <a:t> and </a:t>
             </a:r>
             <a:r>
@@ -2801,7 +2908,7 @@
                   </a:schemeClr>
                 </a:solidFill>
               </a:rPr>
-              <a:t>pageviews</a:t>
+              <a:t>bugs</a:t>
             </a:r>
             <a:r>
               <a:rPr lang="de-DE" sz="1400" dirty="0">
@@ -3162,150 +3269,40 @@
                   </a:schemeClr>
                 </a:solidFill>
               </a:rPr>
-              <a:t> </a:t>
-            </a:r>
-            <a:r>
-              <a:rPr lang="de-DE" sz="1400" dirty="0" err="1">
-                <a:solidFill>
-                  <a:schemeClr val="tx1">
-                    <a:lumMod val="85000"/>
-                    <a:lumOff val="15000"/>
-                  </a:schemeClr>
-                </a:solidFill>
-              </a:rPr>
-              <a:t>every</a:t>
-            </a:r>
-            <a:r>
-              <a:rPr lang="de-DE" sz="1400" dirty="0">
-                <a:solidFill>
-                  <a:schemeClr val="tx1">
-                    <a:lumMod val="85000"/>
-                    <a:lumOff val="15000"/>
-                  </a:schemeClr>
-                </a:solidFill>
-              </a:rPr>
-              <a:t> arc42 </a:t>
-            </a:r>
-            <a:r>
-              <a:rPr lang="de-DE" sz="1400" dirty="0" err="1">
-                <a:solidFill>
-                  <a:schemeClr val="tx1">
-                    <a:lumMod val="85000"/>
-                    <a:lumOff val="15000"/>
-                  </a:schemeClr>
-                </a:solidFill>
-              </a:rPr>
-              <a:t>website</a:t>
-            </a:r>
-            <a:r>
-              <a:rPr lang="de-DE" sz="1400" dirty="0">
-                <a:solidFill>
-                  <a:schemeClr val="tx1">
-                    <a:lumMod val="85000"/>
-                    <a:lumOff val="15000"/>
-                  </a:schemeClr>
-                </a:solidFill>
-              </a:rPr>
-              <a:t> (.de, .</a:t>
-            </a:r>
-            <a:r>
-              <a:rPr lang="de-DE" sz="1400" dirty="0" err="1">
-                <a:solidFill>
-                  <a:schemeClr val="tx1">
-                    <a:lumMod val="85000"/>
-                    <a:lumOff val="15000"/>
-                  </a:schemeClr>
-                </a:solidFill>
-              </a:rPr>
-              <a:t>org</a:t>
-            </a:r>
-            <a:r>
-              <a:rPr lang="de-DE" sz="1400" dirty="0">
-                <a:solidFill>
-                  <a:schemeClr val="tx1">
-                    <a:lumMod val="85000"/>
-                    <a:lumOff val="15000"/>
-                  </a:schemeClr>
-                </a:solidFill>
-              </a:rPr>
-              <a:t>, </a:t>
-            </a:r>
-            <a:r>
-              <a:rPr lang="de-DE" sz="1400" dirty="0" err="1">
-                <a:solidFill>
-                  <a:schemeClr val="tx1">
-                    <a:lumMod val="85000"/>
-                    <a:lumOff val="15000"/>
-                  </a:schemeClr>
-                </a:solidFill>
-              </a:rPr>
-              <a:t>docs</a:t>
-            </a:r>
-            <a:r>
-              <a:rPr lang="de-DE" sz="1400" dirty="0">
-                <a:solidFill>
-                  <a:schemeClr val="tx1">
-                    <a:lumMod val="85000"/>
-                    <a:lumOff val="15000"/>
-                  </a:schemeClr>
-                </a:solidFill>
-              </a:rPr>
-              <a:t>, </a:t>
-            </a:r>
-            <a:r>
-              <a:rPr lang="de-DE" sz="1400" dirty="0" err="1">
-                <a:solidFill>
-                  <a:schemeClr val="tx1">
-                    <a:lumMod val="85000"/>
-                    <a:lumOff val="15000"/>
-                  </a:schemeClr>
-                </a:solidFill>
-              </a:rPr>
-              <a:t>faq</a:t>
-            </a:r>
-            <a:r>
-              <a:rPr lang="de-DE" sz="1400" dirty="0">
-                <a:solidFill>
-                  <a:schemeClr val="tx1">
-                    <a:lumMod val="85000"/>
-                    <a:lumOff val="15000"/>
-                  </a:schemeClr>
-                </a:solidFill>
-              </a:rPr>
-              <a:t>, </a:t>
-            </a:r>
-            <a:r>
-              <a:rPr lang="de-DE" sz="1400" dirty="0" err="1">
-                <a:solidFill>
-                  <a:schemeClr val="tx1">
-                    <a:lumMod val="85000"/>
-                    <a:lumOff val="15000"/>
-                  </a:schemeClr>
-                </a:solidFill>
-              </a:rPr>
-              <a:t>canvas</a:t>
-            </a:r>
-            <a:r>
-              <a:rPr lang="de-DE" sz="1400" dirty="0">
-                <a:solidFill>
-                  <a:schemeClr val="tx1">
-                    <a:lumMod val="85000"/>
-                    <a:lumOff val="15000"/>
-                  </a:schemeClr>
-                </a:solidFill>
-              </a:rPr>
-              <a:t>, </a:t>
-            </a:r>
-            <a:r>
-              <a:rPr lang="de-DE" sz="1400" dirty="0" err="1">
-                <a:solidFill>
-                  <a:schemeClr val="tx1">
-                    <a:lumMod val="85000"/>
-                    <a:lumOff val="15000"/>
-                  </a:schemeClr>
-                </a:solidFill>
-              </a:rPr>
-              <a:t>quality</a:t>
+              <a:t> all arc42 </a:t>
+            </a:r>
+            <a:r>
+              <a:rPr lang="de-DE" sz="1400" dirty="0" err="1">
+                <a:solidFill>
+                  <a:schemeClr val="tx1">
+                    <a:lumMod val="85000"/>
+                    <a:lumOff val="15000"/>
+                  </a:schemeClr>
+                </a:solidFill>
+              </a:rPr>
+              <a:t>websites</a:t>
+            </a:r>
+            <a:r>
+              <a:rPr lang="de-DE" sz="1400" dirty="0">
+                <a:solidFill>
+                  <a:schemeClr val="tx1">
+                    <a:lumMod val="85000"/>
+                    <a:lumOff val="15000"/>
+                  </a:schemeClr>
+                </a:solidFill>
+              </a:rPr>
+              <a:t>: Visitors, </a:t>
+            </a:r>
+            <a:r>
+              <a:rPr lang="de-DE" sz="1400" dirty="0" err="1">
+                <a:solidFill>
+                  <a:schemeClr val="tx1">
+                    <a:lumMod val="85000"/>
+                    <a:lumOff val="15000"/>
+                  </a:schemeClr>
+                </a:solidFill>
+              </a:rPr>
+              <a:t>pageviews</a:t>
             </a:r>
             <a:r>
               <a:rPr lang="de-DE" sz="1400" dirty="0">
@@ -3327,101 +3324,7 @@
                   </a:schemeClr>
                 </a:solidFill>
               </a:rPr>
-              <a:t>status</a:t>
-            </a:r>
-            <a:r>
-              <a:rPr lang="de-DE" sz="1400" dirty="0">
-                <a:solidFill>
-                  <a:schemeClr val="tx1">
-                    <a:lumMod val="85000"/>
-                    <a:lumOff val="15000"/>
-                  </a:schemeClr>
-                </a:solidFill>
-              </a:rPr>
-              <a:t>)</a:t>
-            </a:r>
-          </a:p>
-          <a:p>
-            <a:pPr marL="285750" indent="-285750">
-              <a:buFont typeface="Arial" panose="020B0604020202020204" pitchFamily="34" charset="0"/>
-              <a:buChar char="•"/>
-            </a:pPr>
-            <a:r>
-              <a:rPr lang="de-DE" sz="1400" dirty="0" err="1">
-                <a:solidFill>
-                  <a:schemeClr val="tx1">
-                    <a:lumMod val="85000"/>
-                    <a:lumOff val="15000"/>
-                  </a:schemeClr>
-                </a:solidFill>
-              </a:rPr>
-              <a:t>show</a:t>
-            </a:r>
-            <a:r>
-              <a:rPr lang="de-DE" sz="1400" dirty="0">
-                <a:solidFill>
-                  <a:schemeClr val="tx1">
-                    <a:lumMod val="85000"/>
-                    <a:lumOff val="15000"/>
-                  </a:schemeClr>
-                </a:solidFill>
-              </a:rPr>
-              <a:t> </a:t>
-            </a:r>
-            <a:r>
-              <a:rPr lang="de-DE" sz="1400" dirty="0" err="1">
-                <a:solidFill>
-                  <a:schemeClr val="tx1">
-                    <a:lumMod val="85000"/>
-                    <a:lumOff val="15000"/>
-                  </a:schemeClr>
-                </a:solidFill>
-              </a:rPr>
-              <a:t>issues</a:t>
-            </a:r>
-            <a:r>
-              <a:rPr lang="de-DE" sz="1400" dirty="0">
-                <a:solidFill>
-                  <a:schemeClr val="tx1">
-                    <a:lumMod val="85000"/>
-                    <a:lumOff val="15000"/>
-                  </a:schemeClr>
-                </a:solidFill>
-              </a:rPr>
-              <a:t>/</a:t>
-            </a:r>
-            <a:r>
-              <a:rPr lang="de-DE" sz="1400" dirty="0" err="1">
-                <a:solidFill>
-                  <a:schemeClr val="tx1">
-                    <a:lumMod val="85000"/>
-                    <a:lumOff val="15000"/>
-                  </a:schemeClr>
-                </a:solidFill>
-              </a:rPr>
-              <a:t>bug</a:t>
-            </a:r>
-            <a:r>
-              <a:rPr lang="de-DE" sz="1400" dirty="0">
-                <a:solidFill>
-                  <a:schemeClr val="tx1">
-                    <a:lumMod val="85000"/>
-                    <a:lumOff val="15000"/>
-                  </a:schemeClr>
-                </a:solidFill>
-              </a:rPr>
-              <a:t> </a:t>
-            </a:r>
-            <a:r>
-              <a:rPr lang="de-DE" sz="1400">
-                <a:solidFill>
-                  <a:schemeClr val="tx1">
-                    <a:lumMod val="85000"/>
-                    <a:lumOff val="15000"/>
-                  </a:schemeClr>
-                </a:solidFill>
-              </a:rPr>
-              <a:t>counters </a:t>
+              <a:t>totals</a:t>
             </a:r>
             <a:endParaRPr lang="de-DE" sz="1400" dirty="0">
               <a:solidFill>
@@ -3431,6 +3334,100 @@
                 </a:schemeClr>
               </a:solidFill>
             </a:endParaRPr>
+          </a:p>
+          <a:p>
+            <a:pPr marL="285750" indent="-285750">
+              <a:buFont typeface="Arial" panose="020B0604020202020204" pitchFamily="34" charset="0"/>
+              <a:buChar char="•"/>
+            </a:pPr>
+            <a:r>
+              <a:rPr lang="de-DE" sz="1400" dirty="0" err="1">
+                <a:solidFill>
+                  <a:schemeClr val="tx1">
+                    <a:lumMod val="85000"/>
+                    <a:lumOff val="15000"/>
+                  </a:schemeClr>
+                </a:solidFill>
+              </a:rPr>
+              <a:t>show</a:t>
+            </a:r>
+            <a:r>
+              <a:rPr lang="de-DE" sz="1400" dirty="0">
+                <a:solidFill>
+                  <a:schemeClr val="tx1">
+                    <a:lumMod val="85000"/>
+                    <a:lumOff val="15000"/>
+                  </a:schemeClr>
+                </a:solidFill>
+              </a:rPr>
+              <a:t> </a:t>
+            </a:r>
+            <a:r>
+              <a:rPr lang="de-DE" sz="1400" dirty="0" err="1">
+                <a:solidFill>
+                  <a:schemeClr val="tx1">
+                    <a:lumMod val="85000"/>
+                    <a:lumOff val="15000"/>
+                  </a:schemeClr>
+                </a:solidFill>
+              </a:rPr>
+              <a:t>issues</a:t>
+            </a:r>
+            <a:r>
+              <a:rPr lang="de-DE" sz="1400" dirty="0">
+                <a:solidFill>
+                  <a:schemeClr val="tx1">
+                    <a:lumMod val="85000"/>
+                    <a:lumOff val="15000"/>
+                  </a:schemeClr>
+                </a:solidFill>
+              </a:rPr>
+              <a:t>/</a:t>
+            </a:r>
+            <a:r>
+              <a:rPr lang="de-DE" sz="1400" dirty="0" err="1">
+                <a:solidFill>
+                  <a:schemeClr val="tx1">
+                    <a:lumMod val="85000"/>
+                    <a:lumOff val="15000"/>
+                  </a:schemeClr>
+                </a:solidFill>
+              </a:rPr>
+              <a:t>bug</a:t>
+            </a:r>
+            <a:r>
+              <a:rPr lang="de-DE" sz="1400" dirty="0">
+                <a:solidFill>
+                  <a:schemeClr val="tx1">
+                    <a:lumMod val="85000"/>
+                    <a:lumOff val="15000"/>
+                  </a:schemeClr>
+                </a:solidFill>
+              </a:rPr>
+              <a:t> </a:t>
+            </a:r>
+            <a:r>
+              <a:rPr lang="de-DE" sz="1400" dirty="0" err="1">
+                <a:solidFill>
+                  <a:schemeClr val="tx1">
+                    <a:lumMod val="85000"/>
+                    <a:lumOff val="15000"/>
+                  </a:schemeClr>
+                </a:solidFill>
+              </a:rPr>
+              <a:t>counters</a:t>
+            </a:r>
+            <a:r>
+              <a:rPr lang="de-DE" sz="1400" dirty="0">
+                <a:solidFill>
+                  <a:schemeClr val="tx1">
+                    <a:lumMod val="85000"/>
+                    <a:lumOff val="15000"/>
+                  </a:schemeClr>
+                </a:solidFill>
+              </a:rPr>
+              <a:t> </a:t>
+            </a:r>
           </a:p>
         </p:txBody>
       </p:sp>
@@ -3676,7 +3673,7 @@
                   </a:schemeClr>
                 </a:solidFill>
               </a:rPr>
-              <a:t> https:// </a:t>
+              <a:t> </a:t>
             </a:r>
             <a:r>
               <a:rPr lang="de-DE" sz="1400" dirty="0" err="1">
@@ -4565,18 +4562,18 @@
                   </a:schemeClr>
                 </a:solidFill>
               </a:rPr>
-              <a:t>all relevant </a:t>
-            </a:r>
-            <a:r>
-              <a:rPr lang="de-DE" sz="1400" dirty="0" err="1">
-                <a:solidFill>
-                  <a:schemeClr val="tx1">
-                    <a:lumMod val="85000"/>
-                    <a:lumOff val="15000"/>
-                  </a:schemeClr>
-                </a:solidFill>
-              </a:rPr>
-              <a:t>data</a:t>
+              <a:t>relevant </a:t>
+            </a:r>
+            <a:r>
+              <a:rPr lang="de-DE" sz="1400" dirty="0" err="1">
+                <a:solidFill>
+                  <a:schemeClr val="tx1">
+                    <a:lumMod val="85000"/>
+                    <a:lumOff val="15000"/>
+                  </a:schemeClr>
+                </a:solidFill>
+              </a:rPr>
+              <a:t>numbers</a:t>
             </a:r>
             <a:r>
               <a:rPr lang="de-DE" sz="1400" dirty="0">
@@ -4771,7 +4768,7 @@
         <p:spPr>
           <a:xfrm>
             <a:off x="10854328" y="281372"/>
-            <a:ext cx="1118511" cy="369332"/>
+            <a:ext cx="1110560" cy="369332"/>
           </a:xfrm>
           <a:prstGeom prst="rect">
             <a:avLst/>
@@ -4786,7 +4783,7 @@
           <a:p>
             <a:r>
               <a:rPr lang="de-DE" dirty="0"/>
-              <a:t>Nov. 2023</a:t>
+              <a:t>Dez. 2023</a:t>
             </a:r>
           </a:p>
         </p:txBody>
@@ -4828,40 +4825,28 @@
               <a:buChar char="−"/>
             </a:pPr>
             <a:r>
+              <a:rPr lang="de-DE" sz="1400" dirty="0" err="1"/>
+              <a:t>split</a:t>
+            </a:r>
+            <a:r>
               <a:rPr lang="de-DE" sz="1400" dirty="0"/>
-              <a:t>just ONE slow </a:t>
+              <a:t> in </a:t>
             </a:r>
             <a:r>
               <a:rPr lang="de-DE" sz="1400" dirty="0" err="1"/>
-              <a:t>request</a:t>
+              <a:t>two</a:t>
+            </a:r>
+            <a:r>
+              <a:rPr lang="de-DE" sz="1400" dirty="0"/>
+              <a:t> different GitHub </a:t>
+            </a:r>
+            <a:r>
+              <a:rPr lang="de-DE" sz="1400" dirty="0" err="1"/>
+              <a:t>repos</a:t>
             </a:r>
             <a:r>
               <a:rPr lang="de-DE" sz="1400" dirty="0"/>
               <a:t> </a:t>
-            </a:r>
-            <a:r>
-              <a:rPr lang="de-DE" sz="1400" dirty="0" err="1"/>
-              <a:t>to</a:t>
-            </a:r>
-            <a:r>
-              <a:rPr lang="de-DE" sz="1400" dirty="0"/>
-              <a:t> </a:t>
-            </a:r>
-            <a:r>
-              <a:rPr lang="de-DE" sz="1400" dirty="0" err="1"/>
-              <a:t>create</a:t>
-            </a:r>
-            <a:r>
-              <a:rPr lang="de-DE" sz="1400" dirty="0"/>
-              <a:t> HTML </a:t>
-            </a:r>
-            <a:r>
-              <a:rPr lang="de-DE" sz="1400" dirty="0" err="1"/>
-              <a:t>table</a:t>
-            </a:r>
-            <a:r>
-              <a:rPr lang="de-DE" sz="1400" dirty="0"/>
-              <a:t> (&gt;3500ms) </a:t>
             </a:r>
           </a:p>
         </p:txBody>
@@ -5028,6 +5013,2382 @@
     <p:extLst>
       <p:ext uri="{BB962C8B-B14F-4D97-AF65-F5344CB8AC3E}">
         <p14:creationId xmlns:p14="http://schemas.microsoft.com/office/powerpoint/2010/main" val="1545715125"/>
+      </p:ext>
+    </p:extLst>
+  </p:cSld>
+  <p:clrMapOvr>
+    <a:masterClrMapping/>
+  </p:clrMapOvr>
+</p:sld>
+</file>
+
+<file path=ppt/slides/slide2.xml><?xml version="1.0" encoding="utf-8"?>
+<p:sld xmlns:a="http://schemas.openxmlformats.org/drawingml/2006/main" xmlns:r="http://schemas.openxmlformats.org/officeDocument/2006/relationships" xmlns:p="http://schemas.openxmlformats.org/presentationml/2006/main">
+  <p:cSld>
+    <p:spTree>
+      <p:nvGrpSpPr>
+        <p:cNvPr id="1" name=""/>
+        <p:cNvGrpSpPr/>
+        <p:nvPr/>
+      </p:nvGrpSpPr>
+      <p:grpSpPr>
+        <a:xfrm>
+          <a:off x="0" y="0"/>
+          <a:ext cx="0" cy="0"/>
+          <a:chOff x="0" y="0"/>
+          <a:chExt cx="0" cy="0"/>
+        </a:xfrm>
+      </p:grpSpPr>
+      <p:pic>
+        <p:nvPicPr>
+          <p:cNvPr id="10" name="Grafik 9">
+            <a:extLst>
+              <a:ext uri="{FF2B5EF4-FFF2-40B4-BE49-F238E27FC236}">
+                <a16:creationId xmlns:a16="http://schemas.microsoft.com/office/drawing/2014/main" id="{B84AB489-8668-AAA9-3493-DD34322A71AE}"/>
+              </a:ext>
+            </a:extLst>
+          </p:cNvPr>
+          <p:cNvPicPr>
+            <a:picLocks noChangeAspect="1"/>
+          </p:cNvPicPr>
+          <p:nvPr/>
+        </p:nvPicPr>
+        <p:blipFill>
+          <a:blip r:embed="rId3"/>
+          <a:stretch>
+            <a:fillRect/>
+          </a:stretch>
+        </p:blipFill>
+        <p:spPr>
+          <a:xfrm>
+            <a:off x="7042753" y="3683029"/>
+            <a:ext cx="4930086" cy="2812390"/>
+          </a:xfrm>
+          <a:prstGeom prst="rect">
+            <a:avLst/>
+          </a:prstGeom>
+        </p:spPr>
+      </p:pic>
+      <p:sp>
+        <p:nvSpPr>
+          <p:cNvPr id="3" name="Textfeld 2">
+            <a:extLst>
+              <a:ext uri="{FF2B5EF4-FFF2-40B4-BE49-F238E27FC236}">
+                <a16:creationId xmlns:a16="http://schemas.microsoft.com/office/drawing/2014/main" id="{2FB48AAF-AFA2-BEAC-5656-FDEBE7B58737}"/>
+              </a:ext>
+            </a:extLst>
+          </p:cNvPr>
+          <p:cNvSpPr txBox="1"/>
+          <p:nvPr/>
+        </p:nvSpPr>
+        <p:spPr>
+          <a:xfrm>
+            <a:off x="417095" y="1074820"/>
+            <a:ext cx="2695073" cy="770022"/>
+          </a:xfrm>
+          <a:prstGeom prst="rect">
+            <a:avLst/>
+          </a:prstGeom>
+          <a:solidFill>
+            <a:schemeClr val="accent4">
+              <a:lumMod val="20000"/>
+              <a:lumOff val="80000"/>
+            </a:schemeClr>
+          </a:solidFill>
+        </p:spPr>
+        <p:txBody>
+          <a:bodyPr wrap="square" rtlCol="0">
+            <a:noAutofit/>
+          </a:bodyPr>
+          <a:lstStyle/>
+          <a:p>
+            <a:r>
+              <a:rPr lang="de-DE" sz="1400" dirty="0">
+                <a:solidFill>
+                  <a:schemeClr val="tx1">
+                    <a:lumMod val="85000"/>
+                    <a:lumOff val="15000"/>
+                  </a:schemeClr>
+                </a:solidFill>
+              </a:rPr>
+              <a:t>Show </a:t>
+            </a:r>
+            <a:r>
+              <a:rPr lang="de-DE" sz="1400" dirty="0" err="1">
+                <a:solidFill>
+                  <a:schemeClr val="tx1">
+                    <a:lumMod val="85000"/>
+                    <a:lumOff val="15000"/>
+                  </a:schemeClr>
+                </a:solidFill>
+              </a:rPr>
+              <a:t>detailed</a:t>
+            </a:r>
+            <a:r>
+              <a:rPr lang="de-DE" sz="1400" dirty="0">
+                <a:solidFill>
+                  <a:schemeClr val="tx1">
+                    <a:lumMod val="85000"/>
+                    <a:lumOff val="15000"/>
+                  </a:schemeClr>
+                </a:solidFill>
+              </a:rPr>
+              <a:t> </a:t>
+            </a:r>
+            <a:r>
+              <a:rPr lang="de-DE" sz="1400" dirty="0" err="1">
+                <a:solidFill>
+                  <a:schemeClr val="tx1">
+                    <a:lumMod val="85000"/>
+                    <a:lumOff val="15000"/>
+                  </a:schemeClr>
+                </a:solidFill>
+              </a:rPr>
+              <a:t>aggregate</a:t>
+            </a:r>
+            <a:r>
+              <a:rPr lang="de-DE" sz="1400" dirty="0">
+                <a:solidFill>
+                  <a:schemeClr val="tx1">
+                    <a:lumMod val="85000"/>
+                    <a:lumOff val="15000"/>
+                  </a:schemeClr>
+                </a:solidFill>
+              </a:rPr>
+              <a:t> </a:t>
+            </a:r>
+            <a:r>
+              <a:rPr lang="de-DE" sz="1400" dirty="0" err="1">
+                <a:solidFill>
+                  <a:schemeClr val="tx1">
+                    <a:lumMod val="85000"/>
+                    <a:lumOff val="15000"/>
+                  </a:schemeClr>
+                </a:solidFill>
+              </a:rPr>
+              <a:t>statistics</a:t>
+            </a:r>
+            <a:r>
+              <a:rPr lang="de-DE" sz="1400" dirty="0">
+                <a:solidFill>
+                  <a:schemeClr val="tx1">
+                    <a:lumMod val="85000"/>
+                    <a:lumOff val="15000"/>
+                  </a:schemeClr>
+                </a:solidFill>
+              </a:rPr>
+              <a:t> </a:t>
+            </a:r>
+            <a:r>
+              <a:rPr lang="de-DE" sz="1400" dirty="0" err="1">
+                <a:solidFill>
+                  <a:schemeClr val="tx1">
+                    <a:lumMod val="85000"/>
+                    <a:lumOff val="15000"/>
+                  </a:schemeClr>
+                </a:solidFill>
+              </a:rPr>
+              <a:t>of</a:t>
+            </a:r>
+            <a:r>
+              <a:rPr lang="de-DE" sz="1400" dirty="0">
+                <a:solidFill>
+                  <a:schemeClr val="tx1">
+                    <a:lumMod val="85000"/>
+                    <a:lumOff val="15000"/>
+                  </a:schemeClr>
+                </a:solidFill>
+              </a:rPr>
+              <a:t> </a:t>
+            </a:r>
+            <a:r>
+              <a:rPr lang="de-DE" sz="1400" dirty="0" err="1">
+                <a:solidFill>
+                  <a:schemeClr val="tx1">
+                    <a:lumMod val="85000"/>
+                    <a:lumOff val="15000"/>
+                  </a:schemeClr>
+                </a:solidFill>
+              </a:rPr>
+              <a:t>visitors</a:t>
+            </a:r>
+            <a:r>
+              <a:rPr lang="de-DE" sz="1400" dirty="0">
+                <a:solidFill>
+                  <a:schemeClr val="tx1">
+                    <a:lumMod val="85000"/>
+                    <a:lumOff val="15000"/>
+                  </a:schemeClr>
+                </a:solidFill>
+              </a:rPr>
+              <a:t> and </a:t>
+            </a:r>
+            <a:r>
+              <a:rPr lang="de-DE" sz="1400" dirty="0" err="1">
+                <a:solidFill>
+                  <a:schemeClr val="tx1">
+                    <a:lumMod val="85000"/>
+                    <a:lumOff val="15000"/>
+                  </a:schemeClr>
+                </a:solidFill>
+              </a:rPr>
+              <a:t>pageviews</a:t>
+            </a:r>
+            <a:r>
+              <a:rPr lang="de-DE" sz="1400" dirty="0">
+                <a:solidFill>
+                  <a:schemeClr val="tx1">
+                    <a:lumMod val="85000"/>
+                    <a:lumOff val="15000"/>
+                  </a:schemeClr>
+                </a:solidFill>
+              </a:rPr>
+              <a:t> </a:t>
+            </a:r>
+            <a:r>
+              <a:rPr lang="de-DE" sz="1400" dirty="0" err="1">
+                <a:solidFill>
+                  <a:schemeClr val="tx1">
+                    <a:lumMod val="85000"/>
+                    <a:lumOff val="15000"/>
+                  </a:schemeClr>
+                </a:solidFill>
+              </a:rPr>
+              <a:t>of</a:t>
+            </a:r>
+            <a:r>
+              <a:rPr lang="de-DE" sz="1400" dirty="0">
+                <a:solidFill>
+                  <a:schemeClr val="tx1">
+                    <a:lumMod val="85000"/>
+                    <a:lumOff val="15000"/>
+                  </a:schemeClr>
+                </a:solidFill>
+              </a:rPr>
+              <a:t> all arc42 </a:t>
+            </a:r>
+            <a:r>
+              <a:rPr lang="de-DE" sz="1400" dirty="0" err="1">
+                <a:solidFill>
+                  <a:schemeClr val="tx1">
+                    <a:lumMod val="85000"/>
+                    <a:lumOff val="15000"/>
+                  </a:schemeClr>
+                </a:solidFill>
+              </a:rPr>
+              <a:t>websites</a:t>
+            </a:r>
+            <a:r>
+              <a:rPr lang="de-DE" sz="1400" dirty="0">
+                <a:solidFill>
+                  <a:schemeClr val="tx1">
+                    <a:lumMod val="85000"/>
+                    <a:lumOff val="15000"/>
+                  </a:schemeClr>
+                </a:solidFill>
+              </a:rPr>
+              <a:t>.</a:t>
+            </a:r>
+          </a:p>
+        </p:txBody>
+      </p:sp>
+      <p:sp>
+        <p:nvSpPr>
+          <p:cNvPr id="4" name="Textfeld 3">
+            <a:extLst>
+              <a:ext uri="{FF2B5EF4-FFF2-40B4-BE49-F238E27FC236}">
+                <a16:creationId xmlns:a16="http://schemas.microsoft.com/office/drawing/2014/main" id="{F3E23662-7E84-5B91-BA44-EB5BD0C5361F}"/>
+              </a:ext>
+            </a:extLst>
+          </p:cNvPr>
+          <p:cNvSpPr txBox="1"/>
+          <p:nvPr/>
+        </p:nvSpPr>
+        <p:spPr>
+          <a:xfrm>
+            <a:off x="417094" y="2237872"/>
+            <a:ext cx="2695073" cy="1191128"/>
+          </a:xfrm>
+          <a:prstGeom prst="rect">
+            <a:avLst/>
+          </a:prstGeom>
+          <a:solidFill>
+            <a:schemeClr val="accent4">
+              <a:lumMod val="20000"/>
+              <a:lumOff val="80000"/>
+            </a:schemeClr>
+          </a:solidFill>
+        </p:spPr>
+        <p:txBody>
+          <a:bodyPr wrap="square" rtlCol="0">
+            <a:noAutofit/>
+          </a:bodyPr>
+          <a:lstStyle/>
+          <a:p>
+            <a:pPr marL="285750" indent="-285750">
+              <a:buFont typeface="Arial" panose="020B0604020202020204" pitchFamily="34" charset="0"/>
+              <a:buChar char="•"/>
+            </a:pPr>
+            <a:r>
+              <a:rPr lang="de-DE" sz="1400" dirty="0">
+                <a:solidFill>
+                  <a:schemeClr val="tx1">
+                    <a:lumMod val="85000"/>
+                    <a:lumOff val="15000"/>
+                  </a:schemeClr>
+                </a:solidFill>
+              </a:rPr>
+              <a:t>arc42 </a:t>
+            </a:r>
+            <a:r>
+              <a:rPr lang="de-DE" sz="1400" dirty="0" err="1">
+                <a:solidFill>
+                  <a:schemeClr val="tx1">
+                    <a:lumMod val="85000"/>
+                    <a:lumOff val="15000"/>
+                  </a:schemeClr>
+                </a:solidFill>
+              </a:rPr>
+              <a:t>comitters</a:t>
+            </a:r>
+            <a:endParaRPr lang="de-DE" sz="1400" dirty="0">
+              <a:solidFill>
+                <a:schemeClr val="tx1">
+                  <a:lumMod val="85000"/>
+                  <a:lumOff val="15000"/>
+                </a:schemeClr>
+              </a:solidFill>
+            </a:endParaRPr>
+          </a:p>
+          <a:p>
+            <a:pPr marL="285750" indent="-285750">
+              <a:buFont typeface="Arial" panose="020B0604020202020204" pitchFamily="34" charset="0"/>
+              <a:buChar char="•"/>
+            </a:pPr>
+            <a:r>
+              <a:rPr lang="de-DE" sz="1400" dirty="0" err="1">
+                <a:solidFill>
+                  <a:schemeClr val="tx1">
+                    <a:lumMod val="85000"/>
+                    <a:lumOff val="15000"/>
+                  </a:schemeClr>
+                </a:solidFill>
+              </a:rPr>
+              <a:t>users</a:t>
+            </a:r>
+            <a:r>
+              <a:rPr lang="de-DE" sz="1400" dirty="0">
+                <a:solidFill>
+                  <a:schemeClr val="tx1">
+                    <a:lumMod val="85000"/>
+                    <a:lumOff val="15000"/>
+                  </a:schemeClr>
+                </a:solidFill>
+              </a:rPr>
+              <a:t> </a:t>
+            </a:r>
+            <a:r>
+              <a:rPr lang="de-DE" sz="1400" dirty="0" err="1">
+                <a:solidFill>
+                  <a:schemeClr val="tx1">
+                    <a:lumMod val="85000"/>
+                    <a:lumOff val="15000"/>
+                  </a:schemeClr>
+                </a:solidFill>
+              </a:rPr>
+              <a:t>of</a:t>
+            </a:r>
+            <a:r>
+              <a:rPr lang="de-DE" sz="1400" dirty="0">
+                <a:solidFill>
+                  <a:schemeClr val="tx1">
+                    <a:lumMod val="85000"/>
+                    <a:lumOff val="15000"/>
+                  </a:schemeClr>
+                </a:solidFill>
+              </a:rPr>
+              <a:t> arc42 </a:t>
+            </a:r>
+            <a:r>
+              <a:rPr lang="de-DE" sz="1400" dirty="0" err="1">
+                <a:solidFill>
+                  <a:schemeClr val="tx1">
+                    <a:lumMod val="85000"/>
+                    <a:lumOff val="15000"/>
+                  </a:schemeClr>
+                </a:solidFill>
+              </a:rPr>
+              <a:t>website</a:t>
+            </a:r>
+            <a:r>
+              <a:rPr lang="de-DE" sz="1400" dirty="0">
+                <a:solidFill>
+                  <a:schemeClr val="tx1">
+                    <a:lumMod val="85000"/>
+                    <a:lumOff val="15000"/>
+                  </a:schemeClr>
+                </a:solidFill>
+              </a:rPr>
+              <a:t>(s)</a:t>
+            </a:r>
+          </a:p>
+          <a:p>
+            <a:pPr marL="285750" indent="-285750">
+              <a:buFont typeface="Arial" panose="020B0604020202020204" pitchFamily="34" charset="0"/>
+              <a:buChar char="•"/>
+            </a:pPr>
+            <a:r>
+              <a:rPr lang="de-DE" sz="1400" dirty="0">
+                <a:solidFill>
+                  <a:schemeClr val="tx1">
+                    <a:lumMod val="85000"/>
+                    <a:lumOff val="15000"/>
+                  </a:schemeClr>
+                </a:solidFill>
+              </a:rPr>
+              <a:t>web </a:t>
+            </a:r>
+            <a:r>
+              <a:rPr lang="de-DE" sz="1400" dirty="0" err="1">
+                <a:solidFill>
+                  <a:schemeClr val="tx1">
+                    <a:lumMod val="85000"/>
+                    <a:lumOff val="15000"/>
+                  </a:schemeClr>
+                </a:solidFill>
+              </a:rPr>
+              <a:t>developers</a:t>
+            </a:r>
+            <a:endParaRPr lang="de-DE" sz="1400" dirty="0">
+              <a:solidFill>
+                <a:schemeClr val="tx1">
+                  <a:lumMod val="85000"/>
+                  <a:lumOff val="15000"/>
+                </a:schemeClr>
+              </a:solidFill>
+            </a:endParaRPr>
+          </a:p>
+        </p:txBody>
+      </p:sp>
+      <p:sp>
+        <p:nvSpPr>
+          <p:cNvPr id="5" name="Textfeld 4">
+            <a:extLst>
+              <a:ext uri="{FF2B5EF4-FFF2-40B4-BE49-F238E27FC236}">
+                <a16:creationId xmlns:a16="http://schemas.microsoft.com/office/drawing/2014/main" id="{952AC5DD-972E-919C-3F19-50B6CABE32F4}"/>
+              </a:ext>
+            </a:extLst>
+          </p:cNvPr>
+          <p:cNvSpPr txBox="1"/>
+          <p:nvPr/>
+        </p:nvSpPr>
+        <p:spPr>
+          <a:xfrm>
+            <a:off x="3248527" y="1074819"/>
+            <a:ext cx="2695073" cy="1256831"/>
+          </a:xfrm>
+          <a:prstGeom prst="rect">
+            <a:avLst/>
+          </a:prstGeom>
+          <a:solidFill>
+            <a:schemeClr val="accent4">
+              <a:lumMod val="20000"/>
+              <a:lumOff val="80000"/>
+            </a:schemeClr>
+          </a:solidFill>
+        </p:spPr>
+        <p:txBody>
+          <a:bodyPr wrap="square" rtlCol="0">
+            <a:noAutofit/>
+          </a:bodyPr>
+          <a:lstStyle/>
+          <a:p>
+            <a:pPr marL="285750" indent="-285750">
+              <a:buFont typeface="Arial" panose="020B0604020202020204" pitchFamily="34" charset="0"/>
+              <a:buChar char="•"/>
+            </a:pPr>
+            <a:r>
+              <a:rPr lang="de-DE" sz="1400" dirty="0" err="1">
+                <a:solidFill>
+                  <a:schemeClr val="tx1">
+                    <a:lumMod val="85000"/>
+                    <a:lumOff val="15000"/>
+                  </a:schemeClr>
+                </a:solidFill>
+              </a:rPr>
+              <a:t>show</a:t>
+            </a:r>
+            <a:r>
+              <a:rPr lang="de-DE" sz="1400" dirty="0">
+                <a:solidFill>
+                  <a:schemeClr val="tx1">
+                    <a:lumMod val="85000"/>
+                    <a:lumOff val="15000"/>
+                  </a:schemeClr>
+                </a:solidFill>
+              </a:rPr>
+              <a:t> </a:t>
+            </a:r>
+            <a:r>
+              <a:rPr lang="de-DE" sz="1400" dirty="0" err="1">
+                <a:solidFill>
+                  <a:schemeClr val="tx1">
+                    <a:lumMod val="85000"/>
+                    <a:lumOff val="15000"/>
+                  </a:schemeClr>
+                </a:solidFill>
+              </a:rPr>
+              <a:t>detailed</a:t>
+            </a:r>
+            <a:r>
+              <a:rPr lang="de-DE" sz="1400" dirty="0">
+                <a:solidFill>
+                  <a:schemeClr val="tx1">
+                    <a:lumMod val="85000"/>
+                    <a:lumOff val="15000"/>
+                  </a:schemeClr>
+                </a:solidFill>
+              </a:rPr>
+              <a:t> </a:t>
+            </a:r>
+            <a:r>
+              <a:rPr lang="de-DE" sz="1400" dirty="0" err="1">
+                <a:solidFill>
+                  <a:schemeClr val="tx1">
+                    <a:lumMod val="85000"/>
+                    <a:lumOff val="15000"/>
+                  </a:schemeClr>
+                </a:solidFill>
+              </a:rPr>
+              <a:t>statistics</a:t>
+            </a:r>
+            <a:r>
+              <a:rPr lang="de-DE" sz="1400" dirty="0">
+                <a:solidFill>
+                  <a:schemeClr val="tx1">
+                    <a:lumMod val="85000"/>
+                    <a:lumOff val="15000"/>
+                  </a:schemeClr>
+                </a:solidFill>
+              </a:rPr>
+              <a:t> </a:t>
+            </a:r>
+            <a:r>
+              <a:rPr lang="de-DE" sz="1400" dirty="0" err="1">
+                <a:solidFill>
+                  <a:schemeClr val="tx1">
+                    <a:lumMod val="85000"/>
+                    <a:lumOff val="15000"/>
+                  </a:schemeClr>
+                </a:solidFill>
+              </a:rPr>
+              <a:t>for</a:t>
+            </a:r>
+            <a:r>
+              <a:rPr lang="de-DE" sz="1400" dirty="0">
+                <a:solidFill>
+                  <a:schemeClr val="tx1">
+                    <a:lumMod val="85000"/>
+                    <a:lumOff val="15000"/>
+                  </a:schemeClr>
+                </a:solidFill>
+              </a:rPr>
+              <a:t> all arc42 </a:t>
+            </a:r>
+            <a:r>
+              <a:rPr lang="de-DE" sz="1400" dirty="0" err="1">
+                <a:solidFill>
+                  <a:schemeClr val="tx1">
+                    <a:lumMod val="85000"/>
+                    <a:lumOff val="15000"/>
+                  </a:schemeClr>
+                </a:solidFill>
+              </a:rPr>
+              <a:t>websites</a:t>
+            </a:r>
+            <a:r>
+              <a:rPr lang="de-DE" sz="1400" dirty="0">
+                <a:solidFill>
+                  <a:schemeClr val="tx1">
+                    <a:lumMod val="85000"/>
+                    <a:lumOff val="15000"/>
+                  </a:schemeClr>
+                </a:solidFill>
+              </a:rPr>
+              <a:t>: Visitors, </a:t>
+            </a:r>
+            <a:r>
+              <a:rPr lang="de-DE" sz="1400" dirty="0" err="1">
+                <a:solidFill>
+                  <a:schemeClr val="tx1">
+                    <a:lumMod val="85000"/>
+                    <a:lumOff val="15000"/>
+                  </a:schemeClr>
+                </a:solidFill>
+              </a:rPr>
+              <a:t>pageviews</a:t>
+            </a:r>
+            <a:r>
+              <a:rPr lang="de-DE" sz="1400" dirty="0">
+                <a:solidFill>
+                  <a:schemeClr val="tx1">
+                    <a:lumMod val="85000"/>
+                    <a:lumOff val="15000"/>
+                  </a:schemeClr>
+                </a:solidFill>
+              </a:rPr>
+              <a:t> and </a:t>
+            </a:r>
+            <a:r>
+              <a:rPr lang="de-DE" sz="1400" dirty="0" err="1">
+                <a:solidFill>
+                  <a:schemeClr val="tx1">
+                    <a:lumMod val="85000"/>
+                    <a:lumOff val="15000"/>
+                  </a:schemeClr>
+                </a:solidFill>
+              </a:rPr>
+              <a:t>totals</a:t>
+            </a:r>
+            <a:endParaRPr lang="de-DE" sz="1400" dirty="0">
+              <a:solidFill>
+                <a:schemeClr val="tx1">
+                  <a:lumMod val="85000"/>
+                  <a:lumOff val="15000"/>
+                </a:schemeClr>
+              </a:solidFill>
+            </a:endParaRPr>
+          </a:p>
+          <a:p>
+            <a:pPr marL="285750" indent="-285750">
+              <a:buFont typeface="Arial" panose="020B0604020202020204" pitchFamily="34" charset="0"/>
+              <a:buChar char="•"/>
+            </a:pPr>
+            <a:r>
+              <a:rPr lang="de-DE" sz="1400" dirty="0" err="1">
+                <a:solidFill>
+                  <a:schemeClr val="tx1">
+                    <a:lumMod val="85000"/>
+                    <a:lumOff val="15000"/>
+                  </a:schemeClr>
+                </a:solidFill>
+              </a:rPr>
+              <a:t>show</a:t>
+            </a:r>
+            <a:r>
+              <a:rPr lang="de-DE" sz="1400" dirty="0">
+                <a:solidFill>
+                  <a:schemeClr val="tx1">
+                    <a:lumMod val="85000"/>
+                    <a:lumOff val="15000"/>
+                  </a:schemeClr>
+                </a:solidFill>
+              </a:rPr>
+              <a:t> </a:t>
+            </a:r>
+            <a:r>
+              <a:rPr lang="de-DE" sz="1400" dirty="0" err="1">
+                <a:solidFill>
+                  <a:schemeClr val="tx1">
+                    <a:lumMod val="85000"/>
+                    <a:lumOff val="15000"/>
+                  </a:schemeClr>
+                </a:solidFill>
+              </a:rPr>
+              <a:t>issues</a:t>
+            </a:r>
+            <a:r>
+              <a:rPr lang="de-DE" sz="1400" dirty="0">
+                <a:solidFill>
+                  <a:schemeClr val="tx1">
+                    <a:lumMod val="85000"/>
+                    <a:lumOff val="15000"/>
+                  </a:schemeClr>
+                </a:solidFill>
+              </a:rPr>
+              <a:t>/</a:t>
+            </a:r>
+            <a:r>
+              <a:rPr lang="de-DE" sz="1400" dirty="0" err="1">
+                <a:solidFill>
+                  <a:schemeClr val="tx1">
+                    <a:lumMod val="85000"/>
+                    <a:lumOff val="15000"/>
+                  </a:schemeClr>
+                </a:solidFill>
+              </a:rPr>
+              <a:t>bug</a:t>
+            </a:r>
+            <a:r>
+              <a:rPr lang="de-DE" sz="1400" dirty="0">
+                <a:solidFill>
+                  <a:schemeClr val="tx1">
+                    <a:lumMod val="85000"/>
+                    <a:lumOff val="15000"/>
+                  </a:schemeClr>
+                </a:solidFill>
+              </a:rPr>
+              <a:t> </a:t>
+            </a:r>
+            <a:r>
+              <a:rPr lang="de-DE" sz="1400" dirty="0" err="1">
+                <a:solidFill>
+                  <a:schemeClr val="tx1">
+                    <a:lumMod val="85000"/>
+                    <a:lumOff val="15000"/>
+                  </a:schemeClr>
+                </a:solidFill>
+              </a:rPr>
+              <a:t>counters</a:t>
+            </a:r>
+            <a:r>
+              <a:rPr lang="de-DE" sz="1400" dirty="0">
+                <a:solidFill>
+                  <a:schemeClr val="tx1">
+                    <a:lumMod val="85000"/>
+                    <a:lumOff val="15000"/>
+                  </a:schemeClr>
+                </a:solidFill>
+              </a:rPr>
+              <a:t> </a:t>
+            </a:r>
+          </a:p>
+        </p:txBody>
+      </p:sp>
+      <p:sp>
+        <p:nvSpPr>
+          <p:cNvPr id="6" name="Textfeld 5">
+            <a:extLst>
+              <a:ext uri="{FF2B5EF4-FFF2-40B4-BE49-F238E27FC236}">
+                <a16:creationId xmlns:a16="http://schemas.microsoft.com/office/drawing/2014/main" id="{E5B22B59-E844-AEC0-7CBC-E7E1BE260AE7}"/>
+              </a:ext>
+            </a:extLst>
+          </p:cNvPr>
+          <p:cNvSpPr txBox="1"/>
+          <p:nvPr/>
+        </p:nvSpPr>
+        <p:spPr>
+          <a:xfrm>
+            <a:off x="6200276" y="1074820"/>
+            <a:ext cx="2695073" cy="2354180"/>
+          </a:xfrm>
+          <a:prstGeom prst="rect">
+            <a:avLst/>
+          </a:prstGeom>
+          <a:solidFill>
+            <a:schemeClr val="accent4">
+              <a:lumMod val="20000"/>
+              <a:lumOff val="80000"/>
+            </a:schemeClr>
+          </a:solidFill>
+        </p:spPr>
+        <p:txBody>
+          <a:bodyPr wrap="square" rtlCol="0">
+            <a:noAutofit/>
+          </a:bodyPr>
+          <a:lstStyle/>
+          <a:p>
+            <a:pPr marL="285750" indent="-285750">
+              <a:buClr>
+                <a:schemeClr val="accent6"/>
+              </a:buClr>
+              <a:buFont typeface="Systemschrift Normal"/>
+              <a:buChar char="✚"/>
+            </a:pPr>
+            <a:r>
+              <a:rPr lang="de-DE" sz="1400" dirty="0" err="1">
+                <a:solidFill>
+                  <a:schemeClr val="tx1">
+                    <a:lumMod val="85000"/>
+                    <a:lumOff val="15000"/>
+                  </a:schemeClr>
+                </a:solidFill>
+              </a:rPr>
+              <a:t>static</a:t>
+            </a:r>
+            <a:r>
+              <a:rPr lang="de-DE" sz="1400" dirty="0">
+                <a:solidFill>
+                  <a:schemeClr val="tx1">
+                    <a:lumMod val="85000"/>
+                    <a:lumOff val="15000"/>
+                  </a:schemeClr>
+                </a:solidFill>
+              </a:rPr>
+              <a:t> </a:t>
+            </a:r>
+            <a:r>
+              <a:rPr lang="de-DE" sz="1400" dirty="0" err="1">
+                <a:solidFill>
+                  <a:schemeClr val="tx1">
+                    <a:lumMod val="85000"/>
+                    <a:lumOff val="15000"/>
+                  </a:schemeClr>
+                </a:solidFill>
+              </a:rPr>
+              <a:t>site</a:t>
+            </a:r>
+            <a:r>
+              <a:rPr lang="de-DE" sz="1400" dirty="0">
+                <a:solidFill>
+                  <a:schemeClr val="tx1">
+                    <a:lumMod val="85000"/>
+                    <a:lumOff val="15000"/>
+                  </a:schemeClr>
+                </a:solidFill>
+              </a:rPr>
+              <a:t> </a:t>
+            </a:r>
+            <a:r>
+              <a:rPr lang="de-DE" sz="1400" dirty="0" err="1">
+                <a:solidFill>
+                  <a:schemeClr val="tx1">
+                    <a:lumMod val="85000"/>
+                    <a:lumOff val="15000"/>
+                  </a:schemeClr>
+                </a:solidFill>
+              </a:rPr>
+              <a:t>generator</a:t>
+            </a:r>
+            <a:r>
+              <a:rPr lang="de-DE" sz="1400" dirty="0">
+                <a:solidFill>
+                  <a:schemeClr val="tx1">
+                    <a:lumMod val="85000"/>
+                    <a:lumOff val="15000"/>
+                  </a:schemeClr>
+                </a:solidFill>
+              </a:rPr>
+              <a:t> (Jekyll, </a:t>
+            </a:r>
+            <a:r>
+              <a:rPr lang="de-DE" sz="1400" dirty="0" err="1">
+                <a:solidFill>
+                  <a:schemeClr val="tx1">
+                    <a:lumMod val="85000"/>
+                    <a:lumOff val="15000"/>
+                  </a:schemeClr>
+                </a:solidFill>
+              </a:rPr>
+              <a:t>Github</a:t>
+            </a:r>
+            <a:r>
+              <a:rPr lang="de-DE" sz="1400" dirty="0">
+                <a:solidFill>
+                  <a:schemeClr val="tx1">
+                    <a:lumMod val="85000"/>
+                    <a:lumOff val="15000"/>
+                  </a:schemeClr>
+                </a:solidFill>
+              </a:rPr>
+              <a:t> </a:t>
+            </a:r>
+            <a:r>
+              <a:rPr lang="de-DE" sz="1400" dirty="0" err="1">
+                <a:solidFill>
+                  <a:schemeClr val="tx1">
+                    <a:lumMod val="85000"/>
+                    <a:lumOff val="15000"/>
+                  </a:schemeClr>
+                </a:solidFill>
+              </a:rPr>
+              <a:t>pages</a:t>
+            </a:r>
+            <a:r>
+              <a:rPr lang="de-DE" sz="1400" dirty="0">
+                <a:solidFill>
+                  <a:schemeClr val="tx1">
+                    <a:lumMod val="85000"/>
+                    <a:lumOff val="15000"/>
+                  </a:schemeClr>
+                </a:solidFill>
+              </a:rPr>
+              <a:t>) </a:t>
+            </a:r>
+            <a:r>
+              <a:rPr lang="de-DE" sz="1400" dirty="0" err="1">
+                <a:solidFill>
+                  <a:schemeClr val="tx1">
+                    <a:lumMod val="85000"/>
+                    <a:lumOff val="15000"/>
+                  </a:schemeClr>
+                </a:solidFill>
+              </a:rPr>
+              <a:t>for</a:t>
+            </a:r>
+            <a:r>
+              <a:rPr lang="de-DE" sz="1400" dirty="0">
+                <a:solidFill>
+                  <a:schemeClr val="tx1">
+                    <a:lumMod val="85000"/>
+                    <a:lumOff val="15000"/>
+                  </a:schemeClr>
+                </a:solidFill>
+              </a:rPr>
+              <a:t> </a:t>
+            </a:r>
+            <a:r>
+              <a:rPr lang="de-DE" sz="1400" dirty="0" err="1">
+                <a:solidFill>
+                  <a:schemeClr val="tx1">
+                    <a:lumMod val="85000"/>
+                    <a:lumOff val="15000"/>
+                  </a:schemeClr>
+                </a:solidFill>
+              </a:rPr>
+              <a:t>main</a:t>
+            </a:r>
+            <a:r>
+              <a:rPr lang="de-DE" sz="1400" dirty="0">
+                <a:solidFill>
+                  <a:schemeClr val="tx1">
+                    <a:lumMod val="85000"/>
+                    <a:lumOff val="15000"/>
+                  </a:schemeClr>
+                </a:solidFill>
+              </a:rPr>
+              <a:t> </a:t>
+            </a:r>
+            <a:r>
+              <a:rPr lang="de-DE" sz="1400" dirty="0" err="1">
+                <a:solidFill>
+                  <a:schemeClr val="tx1">
+                    <a:lumMod val="85000"/>
+                    <a:lumOff val="15000"/>
+                  </a:schemeClr>
+                </a:solidFill>
+              </a:rPr>
+              <a:t>site</a:t>
+            </a:r>
+            <a:endParaRPr lang="de-DE" sz="1400" dirty="0">
+              <a:solidFill>
+                <a:schemeClr val="tx1">
+                  <a:lumMod val="85000"/>
+                  <a:lumOff val="15000"/>
+                </a:schemeClr>
+              </a:solidFill>
+            </a:endParaRPr>
+          </a:p>
+          <a:p>
+            <a:pPr marL="285750" indent="-285750">
+              <a:buClr>
+                <a:schemeClr val="accent6"/>
+              </a:buClr>
+              <a:buFont typeface="Systemschrift Normal"/>
+              <a:buChar char="✚"/>
+            </a:pPr>
+            <a:r>
+              <a:rPr lang="de-DE" sz="1400" dirty="0" err="1">
+                <a:solidFill>
+                  <a:schemeClr val="tx1">
+                    <a:lumMod val="85000"/>
+                    <a:lumOff val="15000"/>
+                  </a:schemeClr>
+                </a:solidFill>
+              </a:rPr>
+              <a:t>use</a:t>
+            </a:r>
+            <a:r>
+              <a:rPr lang="de-DE" sz="1400" dirty="0">
+                <a:solidFill>
+                  <a:schemeClr val="tx1">
+                    <a:lumMod val="85000"/>
+                    <a:lumOff val="15000"/>
+                  </a:schemeClr>
+                </a:solidFill>
+              </a:rPr>
+              <a:t> https:// </a:t>
+            </a:r>
+            <a:r>
+              <a:rPr lang="de-DE" sz="1400" dirty="0" err="1">
+                <a:solidFill>
+                  <a:schemeClr val="tx1">
+                    <a:lumMod val="85000"/>
+                    <a:lumOff val="15000"/>
+                  </a:schemeClr>
+                </a:solidFill>
+              </a:rPr>
+              <a:t>plausible.io</a:t>
+            </a:r>
+            <a:r>
+              <a:rPr lang="de-DE" sz="1400" dirty="0">
+                <a:solidFill>
+                  <a:schemeClr val="tx1">
+                    <a:lumMod val="85000"/>
+                    <a:lumOff val="15000"/>
+                  </a:schemeClr>
+                </a:solidFill>
+              </a:rPr>
+              <a:t> </a:t>
+            </a:r>
+            <a:r>
+              <a:rPr lang="de-DE" sz="1400" dirty="0" err="1">
+                <a:solidFill>
+                  <a:schemeClr val="tx1">
+                    <a:lumMod val="85000"/>
+                    <a:lumOff val="15000"/>
+                  </a:schemeClr>
+                </a:solidFill>
+              </a:rPr>
+              <a:t>to</a:t>
+            </a:r>
+            <a:r>
+              <a:rPr lang="de-DE" sz="1400" dirty="0">
+                <a:solidFill>
+                  <a:schemeClr val="tx1">
+                    <a:lumMod val="85000"/>
+                    <a:lumOff val="15000"/>
+                  </a:schemeClr>
+                </a:solidFill>
+              </a:rPr>
+              <a:t> </a:t>
+            </a:r>
+            <a:r>
+              <a:rPr lang="de-DE" sz="1400" dirty="0" err="1">
+                <a:solidFill>
+                  <a:schemeClr val="tx1">
+                    <a:lumMod val="85000"/>
+                    <a:lumOff val="15000"/>
+                  </a:schemeClr>
+                </a:solidFill>
+              </a:rPr>
+              <a:t>collect</a:t>
+            </a:r>
+            <a:r>
+              <a:rPr lang="de-DE" sz="1400" dirty="0">
+                <a:solidFill>
+                  <a:schemeClr val="tx1">
+                    <a:lumMod val="85000"/>
+                    <a:lumOff val="15000"/>
+                  </a:schemeClr>
+                </a:solidFill>
+              </a:rPr>
+              <a:t> </a:t>
+            </a:r>
+            <a:r>
+              <a:rPr lang="de-DE" sz="1400" dirty="0" err="1">
+                <a:solidFill>
+                  <a:schemeClr val="tx1">
+                    <a:lumMod val="85000"/>
+                    <a:lumOff val="15000"/>
+                  </a:schemeClr>
+                </a:solidFill>
+              </a:rPr>
+              <a:t>usage</a:t>
+            </a:r>
+            <a:r>
+              <a:rPr lang="de-DE" sz="1400" dirty="0">
+                <a:solidFill>
+                  <a:schemeClr val="tx1">
+                    <a:lumMod val="85000"/>
+                    <a:lumOff val="15000"/>
+                  </a:schemeClr>
+                </a:solidFill>
+              </a:rPr>
+              <a:t> </a:t>
+            </a:r>
+            <a:r>
+              <a:rPr lang="de-DE" sz="1400" dirty="0" err="1">
+                <a:solidFill>
+                  <a:schemeClr val="tx1">
+                    <a:lumMod val="85000"/>
+                    <a:lumOff val="15000"/>
+                  </a:schemeClr>
+                </a:solidFill>
+              </a:rPr>
+              <a:t>data</a:t>
+            </a:r>
+            <a:endParaRPr lang="de-DE" sz="1400" dirty="0">
+              <a:solidFill>
+                <a:schemeClr val="tx1">
+                  <a:lumMod val="85000"/>
+                  <a:lumOff val="15000"/>
+                </a:schemeClr>
+              </a:solidFill>
+            </a:endParaRPr>
+          </a:p>
+          <a:p>
+            <a:pPr marL="285750" indent="-285750">
+              <a:buClr>
+                <a:schemeClr val="accent6"/>
+              </a:buClr>
+              <a:buFont typeface="Systemschrift Normal"/>
+              <a:buChar char="✚"/>
+            </a:pPr>
+            <a:r>
+              <a:rPr lang="de-DE" sz="1400" dirty="0" err="1">
+                <a:solidFill>
+                  <a:schemeClr val="tx1">
+                    <a:lumMod val="85000"/>
+                    <a:lumOff val="15000"/>
+                  </a:schemeClr>
+                </a:solidFill>
+              </a:rPr>
+              <a:t>use</a:t>
+            </a:r>
+            <a:r>
+              <a:rPr lang="de-DE" sz="1400" dirty="0">
+                <a:solidFill>
+                  <a:schemeClr val="tx1">
+                    <a:lumMod val="85000"/>
+                    <a:lumOff val="15000"/>
+                  </a:schemeClr>
+                </a:solidFill>
+              </a:rPr>
+              <a:t> </a:t>
+            </a:r>
+            <a:r>
+              <a:rPr lang="de-DE" sz="1400" dirty="0" err="1">
+                <a:solidFill>
+                  <a:schemeClr val="tx1">
+                    <a:lumMod val="85000"/>
+                    <a:lumOff val="15000"/>
+                  </a:schemeClr>
+                </a:solidFill>
+              </a:rPr>
+              <a:t>fly.io</a:t>
+            </a:r>
+            <a:r>
+              <a:rPr lang="de-DE" sz="1400" dirty="0">
+                <a:solidFill>
+                  <a:schemeClr val="tx1">
+                    <a:lumMod val="85000"/>
+                    <a:lumOff val="15000"/>
+                  </a:schemeClr>
+                </a:solidFill>
+              </a:rPr>
+              <a:t> </a:t>
+            </a:r>
+            <a:r>
+              <a:rPr lang="de-DE" sz="1400" dirty="0" err="1">
+                <a:solidFill>
+                  <a:schemeClr val="tx1">
+                    <a:lumMod val="85000"/>
+                    <a:lumOff val="15000"/>
+                  </a:schemeClr>
+                </a:solidFill>
+              </a:rPr>
+              <a:t>for</a:t>
+            </a:r>
+            <a:r>
+              <a:rPr lang="de-DE" sz="1400" dirty="0">
+                <a:solidFill>
+                  <a:schemeClr val="tx1">
+                    <a:lumMod val="85000"/>
+                    <a:lumOff val="15000"/>
+                  </a:schemeClr>
+                </a:solidFill>
+              </a:rPr>
+              <a:t> </a:t>
+            </a:r>
+            <a:r>
+              <a:rPr lang="de-DE" sz="1400" dirty="0" err="1">
+                <a:solidFill>
+                  <a:schemeClr val="tx1">
+                    <a:lumMod val="85000"/>
+                    <a:lumOff val="15000"/>
+                  </a:schemeClr>
+                </a:solidFill>
+              </a:rPr>
+              <a:t>deployment</a:t>
+            </a:r>
+            <a:endParaRPr lang="de-DE" sz="1400" dirty="0">
+              <a:solidFill>
+                <a:schemeClr val="tx1">
+                  <a:lumMod val="85000"/>
+                  <a:lumOff val="15000"/>
+                </a:schemeClr>
+              </a:solidFill>
+            </a:endParaRPr>
+          </a:p>
+          <a:p>
+            <a:pPr marL="285750" indent="-285750">
+              <a:buClr>
+                <a:schemeClr val="accent6"/>
+              </a:buClr>
+              <a:buFont typeface="Systemschrift Normal"/>
+              <a:buChar char="✚"/>
+            </a:pPr>
+            <a:r>
+              <a:rPr lang="de-DE" sz="1400" dirty="0" err="1">
+                <a:solidFill>
+                  <a:schemeClr val="tx1">
+                    <a:lumMod val="85000"/>
+                    <a:lumOff val="15000"/>
+                  </a:schemeClr>
+                </a:solidFill>
+              </a:rPr>
+              <a:t>use</a:t>
+            </a:r>
+            <a:r>
+              <a:rPr lang="de-DE" sz="1400" dirty="0">
+                <a:solidFill>
+                  <a:schemeClr val="tx1">
+                    <a:lumMod val="85000"/>
+                    <a:lumOff val="15000"/>
+                  </a:schemeClr>
+                </a:solidFill>
+              </a:rPr>
+              <a:t> </a:t>
+            </a:r>
+            <a:r>
+              <a:rPr lang="de-DE" sz="1400" dirty="0" err="1">
+                <a:solidFill>
+                  <a:schemeClr val="tx1">
+                    <a:lumMod val="85000"/>
+                    <a:lumOff val="15000"/>
+                  </a:schemeClr>
+                </a:solidFill>
+              </a:rPr>
+              <a:t>Golang</a:t>
+            </a:r>
+            <a:r>
+              <a:rPr lang="de-DE" sz="1400" dirty="0">
+                <a:solidFill>
+                  <a:schemeClr val="tx1">
+                    <a:lumMod val="85000"/>
+                    <a:lumOff val="15000"/>
+                  </a:schemeClr>
+                </a:solidFill>
+              </a:rPr>
+              <a:t> </a:t>
+            </a:r>
+            <a:r>
+              <a:rPr lang="de-DE" sz="1400" dirty="0" err="1">
+                <a:solidFill>
+                  <a:schemeClr val="tx1">
+                    <a:lumMod val="85000"/>
+                    <a:lumOff val="15000"/>
+                  </a:schemeClr>
+                </a:solidFill>
+              </a:rPr>
+              <a:t>to</a:t>
+            </a:r>
+            <a:r>
+              <a:rPr lang="de-DE" sz="1400" dirty="0">
+                <a:solidFill>
+                  <a:schemeClr val="tx1">
+                    <a:lumMod val="85000"/>
+                    <a:lumOff val="15000"/>
+                  </a:schemeClr>
+                </a:solidFill>
+              </a:rPr>
+              <a:t> </a:t>
+            </a:r>
+            <a:r>
+              <a:rPr lang="de-DE" sz="1400" dirty="0" err="1">
+                <a:solidFill>
+                  <a:schemeClr val="tx1">
+                    <a:lumMod val="85000"/>
+                    <a:lumOff val="15000"/>
+                  </a:schemeClr>
+                </a:solidFill>
+              </a:rPr>
+              <a:t>wrap</a:t>
+            </a:r>
+            <a:r>
+              <a:rPr lang="de-DE" sz="1400" dirty="0">
+                <a:solidFill>
+                  <a:schemeClr val="tx1">
+                    <a:lumMod val="85000"/>
+                    <a:lumOff val="15000"/>
+                  </a:schemeClr>
+                </a:solidFill>
+              </a:rPr>
+              <a:t> </a:t>
+            </a:r>
+            <a:r>
+              <a:rPr lang="de-DE" sz="1400" dirty="0" err="1">
+                <a:solidFill>
+                  <a:schemeClr val="tx1">
+                    <a:lumMod val="85000"/>
+                    <a:lumOff val="15000"/>
+                  </a:schemeClr>
+                </a:solidFill>
+              </a:rPr>
+              <a:t>statistics</a:t>
+            </a:r>
+            <a:r>
+              <a:rPr lang="de-DE" sz="1400" dirty="0">
+                <a:solidFill>
+                  <a:schemeClr val="tx1">
+                    <a:lumMod val="85000"/>
+                    <a:lumOff val="15000"/>
+                  </a:schemeClr>
+                </a:solidFill>
+              </a:rPr>
+              <a:t> </a:t>
+            </a:r>
+            <a:r>
+              <a:rPr lang="de-DE" sz="1400" dirty="0" err="1">
+                <a:solidFill>
+                  <a:schemeClr val="tx1">
+                    <a:lumMod val="85000"/>
+                    <a:lumOff val="15000"/>
+                  </a:schemeClr>
+                </a:solidFill>
+              </a:rPr>
+              <a:t>service</a:t>
+            </a:r>
+            <a:endParaRPr lang="de-DE" sz="1400" dirty="0">
+              <a:solidFill>
+                <a:schemeClr val="tx1">
+                  <a:lumMod val="85000"/>
+                  <a:lumOff val="15000"/>
+                </a:schemeClr>
+              </a:solidFill>
+            </a:endParaRPr>
+          </a:p>
+        </p:txBody>
+      </p:sp>
+      <p:sp>
+        <p:nvSpPr>
+          <p:cNvPr id="7" name="Textfeld 6">
+            <a:extLst>
+              <a:ext uri="{FF2B5EF4-FFF2-40B4-BE49-F238E27FC236}">
+                <a16:creationId xmlns:a16="http://schemas.microsoft.com/office/drawing/2014/main" id="{2446785F-EACF-53C3-73F7-9AE5159093B6}"/>
+              </a:ext>
+            </a:extLst>
+          </p:cNvPr>
+          <p:cNvSpPr txBox="1"/>
+          <p:nvPr/>
+        </p:nvSpPr>
+        <p:spPr>
+          <a:xfrm>
+            <a:off x="9103899" y="1074820"/>
+            <a:ext cx="2695073" cy="2354180"/>
+          </a:xfrm>
+          <a:prstGeom prst="rect">
+            <a:avLst/>
+          </a:prstGeom>
+          <a:solidFill>
+            <a:schemeClr val="accent4">
+              <a:lumMod val="20000"/>
+              <a:lumOff val="80000"/>
+            </a:schemeClr>
+          </a:solidFill>
+        </p:spPr>
+        <p:txBody>
+          <a:bodyPr wrap="square" rtlCol="0">
+            <a:noAutofit/>
+          </a:bodyPr>
+          <a:lstStyle/>
+          <a:p>
+            <a:pPr marL="285750" indent="-285750">
+              <a:buFont typeface="Arial" panose="020B0604020202020204" pitchFamily="34" charset="0"/>
+              <a:buChar char="•"/>
+            </a:pPr>
+            <a:r>
+              <a:rPr lang="de-DE" sz="1400" dirty="0" err="1">
+                <a:solidFill>
+                  <a:schemeClr val="tx1">
+                    <a:lumMod val="85000"/>
+                    <a:lumOff val="15000"/>
+                  </a:schemeClr>
+                </a:solidFill>
+              </a:rPr>
+              <a:t>Markdown</a:t>
+            </a:r>
+            <a:r>
+              <a:rPr lang="de-DE" sz="1400" dirty="0">
+                <a:solidFill>
+                  <a:schemeClr val="tx1">
+                    <a:lumMod val="85000"/>
+                    <a:lumOff val="15000"/>
+                  </a:schemeClr>
+                </a:solidFill>
+              </a:rPr>
+              <a:t> + </a:t>
+            </a:r>
+            <a:r>
+              <a:rPr lang="de-DE" sz="1400" dirty="0" err="1">
+                <a:solidFill>
+                  <a:schemeClr val="tx1">
+                    <a:lumMod val="85000"/>
+                    <a:lumOff val="15000"/>
+                  </a:schemeClr>
+                </a:solidFill>
+              </a:rPr>
+              <a:t>plain</a:t>
+            </a:r>
+            <a:r>
+              <a:rPr lang="de-DE" sz="1400" dirty="0">
+                <a:solidFill>
+                  <a:schemeClr val="tx1">
+                    <a:lumMod val="85000"/>
+                    <a:lumOff val="15000"/>
+                  </a:schemeClr>
+                </a:solidFill>
+              </a:rPr>
+              <a:t> HTML </a:t>
+            </a:r>
+          </a:p>
+          <a:p>
+            <a:pPr marL="285750" indent="-285750">
+              <a:buFont typeface="Arial" panose="020B0604020202020204" pitchFamily="34" charset="0"/>
+              <a:buChar char="•"/>
+            </a:pPr>
+            <a:r>
+              <a:rPr lang="de-DE" sz="1400" dirty="0" err="1">
+                <a:solidFill>
+                  <a:schemeClr val="tx1">
+                    <a:lumMod val="85000"/>
+                    <a:lumOff val="15000"/>
+                  </a:schemeClr>
+                </a:solidFill>
+              </a:rPr>
+              <a:t>Golang</a:t>
+            </a:r>
+            <a:r>
+              <a:rPr lang="de-DE" sz="1400" dirty="0">
+                <a:solidFill>
+                  <a:schemeClr val="tx1">
+                    <a:lumMod val="85000"/>
+                    <a:lumOff val="15000"/>
+                  </a:schemeClr>
+                </a:solidFill>
+              </a:rPr>
+              <a:t> </a:t>
+            </a:r>
+            <a:r>
+              <a:rPr lang="de-DE" sz="1400" dirty="0" err="1">
+                <a:solidFill>
+                  <a:schemeClr val="tx1">
+                    <a:lumMod val="85000"/>
+                    <a:lumOff val="15000"/>
+                  </a:schemeClr>
+                </a:solidFill>
+              </a:rPr>
+              <a:t>with</a:t>
+            </a:r>
+            <a:r>
+              <a:rPr lang="de-DE" sz="1400" dirty="0">
+                <a:solidFill>
+                  <a:schemeClr val="tx1">
+                    <a:lumMod val="85000"/>
+                    <a:lumOff val="15000"/>
+                  </a:schemeClr>
+                </a:solidFill>
+              </a:rPr>
+              <a:t> </a:t>
+            </a:r>
+            <a:r>
+              <a:rPr lang="de-DE" sz="1400" dirty="0" err="1">
+                <a:solidFill>
+                  <a:schemeClr val="tx1">
+                    <a:lumMod val="85000"/>
+                    <a:lumOff val="15000"/>
+                  </a:schemeClr>
+                </a:solidFill>
+              </a:rPr>
+              <a:t>packages</a:t>
+            </a:r>
+            <a:endParaRPr lang="de-DE" sz="1400" dirty="0">
+              <a:solidFill>
+                <a:schemeClr val="tx1">
+                  <a:lumMod val="85000"/>
+                  <a:lumOff val="15000"/>
+                </a:schemeClr>
+              </a:solidFill>
+            </a:endParaRPr>
+          </a:p>
+          <a:p>
+            <a:pPr marL="742950" lvl="1" indent="-285750">
+              <a:buFont typeface="Arial" panose="020B0604020202020204" pitchFamily="34" charset="0"/>
+              <a:buChar char="•"/>
+            </a:pPr>
+            <a:r>
+              <a:rPr lang="de-DE" sz="1400" dirty="0" err="1">
+                <a:solidFill>
+                  <a:schemeClr val="tx1">
+                    <a:lumMod val="85000"/>
+                    <a:lumOff val="15000"/>
+                  </a:schemeClr>
+                </a:solidFill>
+              </a:rPr>
+              <a:t>net</a:t>
+            </a:r>
+            <a:r>
+              <a:rPr lang="de-DE" sz="1400" dirty="0">
+                <a:solidFill>
+                  <a:schemeClr val="tx1">
+                    <a:lumMod val="85000"/>
+                    <a:lumOff val="15000"/>
+                  </a:schemeClr>
+                </a:solidFill>
+              </a:rPr>
+              <a:t>/http, http/</a:t>
+            </a:r>
+            <a:r>
+              <a:rPr lang="de-DE" sz="1400" dirty="0" err="1">
+                <a:solidFill>
+                  <a:schemeClr val="tx1">
+                    <a:lumMod val="85000"/>
+                    <a:lumOff val="15000"/>
+                  </a:schemeClr>
+                </a:solidFill>
+              </a:rPr>
+              <a:t>template</a:t>
+            </a:r>
+            <a:endParaRPr lang="de-DE" sz="1400" dirty="0">
+              <a:solidFill>
+                <a:schemeClr val="tx1">
+                  <a:lumMod val="85000"/>
+                  <a:lumOff val="15000"/>
+                </a:schemeClr>
+              </a:solidFill>
+            </a:endParaRPr>
+          </a:p>
+          <a:p>
+            <a:pPr marL="742950" lvl="1" indent="-285750">
+              <a:buFont typeface="Arial" panose="020B0604020202020204" pitchFamily="34" charset="0"/>
+              <a:buChar char="•"/>
+            </a:pPr>
+            <a:r>
+              <a:rPr lang="de-DE" sz="1400" dirty="0" err="1">
+                <a:solidFill>
+                  <a:schemeClr val="tx1">
+                    <a:lumMod val="85000"/>
+                    <a:lumOff val="15000"/>
+                  </a:schemeClr>
+                </a:solidFill>
+              </a:rPr>
+              <a:t>zerolog</a:t>
+            </a:r>
+            <a:r>
+              <a:rPr lang="de-DE" sz="1400" dirty="0">
+                <a:solidFill>
+                  <a:schemeClr val="tx1">
+                    <a:lumMod val="85000"/>
+                    <a:lumOff val="15000"/>
+                  </a:schemeClr>
+                </a:solidFill>
+              </a:rPr>
+              <a:t>	</a:t>
+            </a:r>
+          </a:p>
+          <a:p>
+            <a:pPr marL="285750" indent="-285750">
+              <a:buFont typeface="Arial" panose="020B0604020202020204" pitchFamily="34" charset="0"/>
+              <a:buChar char="•"/>
+            </a:pPr>
+            <a:endParaRPr lang="de-DE" sz="1400" dirty="0">
+              <a:solidFill>
+                <a:schemeClr val="tx1">
+                  <a:lumMod val="85000"/>
+                  <a:lumOff val="15000"/>
+                </a:schemeClr>
+              </a:solidFill>
+            </a:endParaRPr>
+          </a:p>
+          <a:p>
+            <a:pPr marL="285750" indent="-285750">
+              <a:buFont typeface="Arial" panose="020B0604020202020204" pitchFamily="34" charset="0"/>
+              <a:buChar char="•"/>
+            </a:pPr>
+            <a:r>
+              <a:rPr lang="de-DE" sz="1400" dirty="0" err="1">
+                <a:solidFill>
+                  <a:schemeClr val="tx1">
+                    <a:lumMod val="85000"/>
+                    <a:lumOff val="15000"/>
+                  </a:schemeClr>
+                </a:solidFill>
+              </a:rPr>
+              <a:t>htmx</a:t>
+            </a:r>
+            <a:r>
+              <a:rPr lang="de-DE" sz="1400" dirty="0">
+                <a:solidFill>
+                  <a:schemeClr val="tx1">
+                    <a:lumMod val="85000"/>
+                    <a:lumOff val="15000"/>
+                  </a:schemeClr>
+                </a:solidFill>
+              </a:rPr>
+              <a:t> </a:t>
+            </a:r>
+            <a:r>
+              <a:rPr lang="de-DE" sz="1400" dirty="0" err="1">
+                <a:solidFill>
+                  <a:schemeClr val="tx1">
+                    <a:lumMod val="85000"/>
+                    <a:lumOff val="15000"/>
+                  </a:schemeClr>
+                </a:solidFill>
+              </a:rPr>
+              <a:t>to</a:t>
+            </a:r>
+            <a:r>
+              <a:rPr lang="de-DE" sz="1400" dirty="0">
+                <a:solidFill>
+                  <a:schemeClr val="tx1">
+                    <a:lumMod val="85000"/>
+                    <a:lumOff val="15000"/>
+                  </a:schemeClr>
+                </a:solidFill>
+              </a:rPr>
+              <a:t> perform DOM </a:t>
+            </a:r>
+            <a:r>
+              <a:rPr lang="de-DE" sz="1400" dirty="0" err="1">
+                <a:solidFill>
+                  <a:schemeClr val="tx1">
+                    <a:lumMod val="85000"/>
+                    <a:lumOff val="15000"/>
+                  </a:schemeClr>
+                </a:solidFill>
+              </a:rPr>
+              <a:t>manipulation</a:t>
+            </a:r>
+            <a:r>
+              <a:rPr lang="de-DE" sz="1400" dirty="0">
+                <a:solidFill>
+                  <a:schemeClr val="tx1">
+                    <a:lumMod val="85000"/>
+                    <a:lumOff val="15000"/>
+                  </a:schemeClr>
+                </a:solidFill>
+              </a:rPr>
+              <a:t> at </a:t>
+            </a:r>
+            <a:r>
+              <a:rPr lang="de-DE" sz="1400" dirty="0" err="1">
+                <a:solidFill>
+                  <a:schemeClr val="tx1">
+                    <a:lumMod val="85000"/>
+                    <a:lumOff val="15000"/>
+                  </a:schemeClr>
+                </a:solidFill>
+              </a:rPr>
+              <a:t>runtime</a:t>
+            </a:r>
+            <a:endParaRPr lang="de-DE" sz="1400" dirty="0">
+              <a:solidFill>
+                <a:schemeClr val="tx1">
+                  <a:lumMod val="85000"/>
+                  <a:lumOff val="15000"/>
+                </a:schemeClr>
+              </a:solidFill>
+            </a:endParaRPr>
+          </a:p>
+          <a:p>
+            <a:pPr marL="285750" indent="-285750">
+              <a:buFont typeface="Arial" panose="020B0604020202020204" pitchFamily="34" charset="0"/>
+              <a:buChar char="•"/>
+            </a:pPr>
+            <a:endParaRPr lang="de-DE" sz="1400" dirty="0">
+              <a:solidFill>
+                <a:schemeClr val="tx1">
+                  <a:lumMod val="85000"/>
+                  <a:lumOff val="15000"/>
+                </a:schemeClr>
+              </a:solidFill>
+            </a:endParaRPr>
+          </a:p>
+          <a:p>
+            <a:pPr marL="285750" indent="-285750">
+              <a:buFont typeface="Arial" panose="020B0604020202020204" pitchFamily="34" charset="0"/>
+              <a:buChar char="•"/>
+            </a:pPr>
+            <a:r>
+              <a:rPr lang="de-DE" sz="1400" dirty="0" err="1">
+                <a:solidFill>
+                  <a:schemeClr val="tx1">
+                    <a:lumMod val="85000"/>
+                    <a:lumOff val="15000"/>
+                  </a:schemeClr>
+                </a:solidFill>
+              </a:rPr>
+              <a:t>fly.io</a:t>
+            </a:r>
+            <a:r>
+              <a:rPr lang="de-DE" sz="1400" dirty="0">
+                <a:solidFill>
+                  <a:schemeClr val="tx1">
+                    <a:lumMod val="85000"/>
+                    <a:lumOff val="15000"/>
+                  </a:schemeClr>
+                </a:solidFill>
+              </a:rPr>
+              <a:t> </a:t>
+            </a:r>
+            <a:r>
+              <a:rPr lang="de-DE" sz="1400" dirty="0" err="1">
+                <a:solidFill>
+                  <a:schemeClr val="tx1">
+                    <a:lumMod val="85000"/>
+                    <a:lumOff val="15000"/>
+                  </a:schemeClr>
+                </a:solidFill>
+              </a:rPr>
+              <a:t>for</a:t>
+            </a:r>
+            <a:r>
+              <a:rPr lang="de-DE" sz="1400" dirty="0">
+                <a:solidFill>
+                  <a:schemeClr val="tx1">
+                    <a:lumMod val="85000"/>
+                    <a:lumOff val="15000"/>
+                  </a:schemeClr>
+                </a:solidFill>
+              </a:rPr>
+              <a:t> </a:t>
+            </a:r>
+            <a:r>
+              <a:rPr lang="de-DE" sz="1400" dirty="0" err="1">
+                <a:solidFill>
+                  <a:schemeClr val="tx1">
+                    <a:lumMod val="85000"/>
+                    <a:lumOff val="15000"/>
+                  </a:schemeClr>
+                </a:solidFill>
+              </a:rPr>
+              <a:t>deployment</a:t>
+            </a:r>
+            <a:endParaRPr lang="de-DE" sz="1400" dirty="0">
+              <a:solidFill>
+                <a:schemeClr val="tx1">
+                  <a:lumMod val="85000"/>
+                  <a:lumOff val="15000"/>
+                </a:schemeClr>
+              </a:solidFill>
+            </a:endParaRPr>
+          </a:p>
+        </p:txBody>
+      </p:sp>
+      <p:sp>
+        <p:nvSpPr>
+          <p:cNvPr id="8" name="Textfeld 7">
+            <a:extLst>
+              <a:ext uri="{FF2B5EF4-FFF2-40B4-BE49-F238E27FC236}">
+                <a16:creationId xmlns:a16="http://schemas.microsoft.com/office/drawing/2014/main" id="{ACCB1BE3-DD3B-D5DD-6F1B-8C58A28112C9}"/>
+              </a:ext>
+            </a:extLst>
+          </p:cNvPr>
+          <p:cNvSpPr txBox="1"/>
+          <p:nvPr/>
+        </p:nvSpPr>
+        <p:spPr>
+          <a:xfrm>
+            <a:off x="3248527" y="2733260"/>
+            <a:ext cx="2695073" cy="747742"/>
+          </a:xfrm>
+          <a:prstGeom prst="rect">
+            <a:avLst/>
+          </a:prstGeom>
+          <a:solidFill>
+            <a:schemeClr val="accent4">
+              <a:lumMod val="20000"/>
+              <a:lumOff val="80000"/>
+            </a:schemeClr>
+          </a:solidFill>
+        </p:spPr>
+        <p:txBody>
+          <a:bodyPr wrap="square" rtlCol="0">
+            <a:noAutofit/>
+          </a:bodyPr>
+          <a:lstStyle/>
+          <a:p>
+            <a:pPr marL="285750" indent="-285750">
+              <a:buFont typeface="Arial" panose="020B0604020202020204" pitchFamily="34" charset="0"/>
+              <a:buChar char="•"/>
+            </a:pPr>
+            <a:r>
+              <a:rPr lang="de-DE" sz="1400" dirty="0" err="1">
+                <a:solidFill>
+                  <a:schemeClr val="tx1">
+                    <a:lumMod val="85000"/>
+                    <a:lumOff val="15000"/>
+                  </a:schemeClr>
+                </a:solidFill>
+              </a:rPr>
+              <a:t>accurate</a:t>
+            </a:r>
+            <a:r>
+              <a:rPr lang="de-DE" sz="1400" dirty="0">
+                <a:solidFill>
+                  <a:schemeClr val="tx1">
+                    <a:lumMod val="85000"/>
+                    <a:lumOff val="15000"/>
+                  </a:schemeClr>
+                </a:solidFill>
+              </a:rPr>
+              <a:t> </a:t>
+            </a:r>
+            <a:r>
+              <a:rPr lang="de-DE" sz="1400" dirty="0" err="1">
+                <a:solidFill>
+                  <a:schemeClr val="tx1">
+                    <a:lumMod val="85000"/>
+                    <a:lumOff val="15000"/>
+                  </a:schemeClr>
+                </a:solidFill>
+              </a:rPr>
+              <a:t>results</a:t>
+            </a:r>
+            <a:endParaRPr lang="de-DE" sz="1400" dirty="0">
+              <a:solidFill>
+                <a:schemeClr val="tx1">
+                  <a:lumMod val="85000"/>
+                  <a:lumOff val="15000"/>
+                </a:schemeClr>
+              </a:solidFill>
+            </a:endParaRPr>
+          </a:p>
+          <a:p>
+            <a:pPr marL="285750" indent="-285750">
+              <a:buFont typeface="Arial" panose="020B0604020202020204" pitchFamily="34" charset="0"/>
+              <a:buChar char="•"/>
+            </a:pPr>
+            <a:r>
+              <a:rPr lang="de-DE" sz="1400" dirty="0">
+                <a:solidFill>
+                  <a:schemeClr val="tx1">
+                    <a:lumMod val="85000"/>
+                    <a:lumOff val="15000"/>
+                  </a:schemeClr>
+                </a:solidFill>
+              </a:rPr>
+              <a:t>simple </a:t>
+            </a:r>
+            <a:r>
+              <a:rPr lang="de-DE" sz="1400" dirty="0" err="1">
+                <a:solidFill>
+                  <a:schemeClr val="tx1">
+                    <a:lumMod val="85000"/>
+                    <a:lumOff val="15000"/>
+                  </a:schemeClr>
+                </a:solidFill>
+              </a:rPr>
+              <a:t>visualization</a:t>
+            </a:r>
+            <a:endParaRPr lang="de-DE" sz="1400" dirty="0">
+              <a:solidFill>
+                <a:schemeClr val="tx1">
+                  <a:lumMod val="85000"/>
+                  <a:lumOff val="15000"/>
+                </a:schemeClr>
+              </a:solidFill>
+            </a:endParaRPr>
+          </a:p>
+          <a:p>
+            <a:pPr marL="285750" indent="-285750">
+              <a:buFont typeface="Arial" panose="020B0604020202020204" pitchFamily="34" charset="0"/>
+              <a:buChar char="•"/>
+            </a:pPr>
+            <a:r>
+              <a:rPr lang="de-DE" sz="1400" dirty="0">
+                <a:solidFill>
+                  <a:schemeClr val="tx1">
+                    <a:lumMod val="85000"/>
+                    <a:lumOff val="15000"/>
+                  </a:schemeClr>
+                </a:solidFill>
+              </a:rPr>
+              <a:t>all relevant </a:t>
+            </a:r>
+            <a:r>
+              <a:rPr lang="de-DE" sz="1400" dirty="0" err="1">
+                <a:solidFill>
+                  <a:schemeClr val="tx1">
+                    <a:lumMod val="85000"/>
+                    <a:lumOff val="15000"/>
+                  </a:schemeClr>
+                </a:solidFill>
+              </a:rPr>
+              <a:t>data</a:t>
+            </a:r>
+            <a:r>
+              <a:rPr lang="de-DE" sz="1400" dirty="0">
+                <a:solidFill>
+                  <a:schemeClr val="tx1">
+                    <a:lumMod val="85000"/>
+                    <a:lumOff val="15000"/>
+                  </a:schemeClr>
+                </a:solidFill>
+              </a:rPr>
+              <a:t> at a </a:t>
+            </a:r>
+            <a:r>
+              <a:rPr lang="de-DE" sz="1400" dirty="0" err="1">
+                <a:solidFill>
+                  <a:schemeClr val="tx1">
+                    <a:lumMod val="85000"/>
+                    <a:lumOff val="15000"/>
+                  </a:schemeClr>
+                </a:solidFill>
+              </a:rPr>
+              <a:t>glance</a:t>
+            </a:r>
+            <a:endParaRPr lang="de-DE" sz="1400" dirty="0">
+              <a:solidFill>
+                <a:schemeClr val="tx1">
+                  <a:lumMod val="85000"/>
+                  <a:lumOff val="15000"/>
+                </a:schemeClr>
+              </a:solidFill>
+            </a:endParaRPr>
+          </a:p>
+        </p:txBody>
+      </p:sp>
+      <p:sp>
+        <p:nvSpPr>
+          <p:cNvPr id="11" name="Textfeld 10">
+            <a:extLst>
+              <a:ext uri="{FF2B5EF4-FFF2-40B4-BE49-F238E27FC236}">
+                <a16:creationId xmlns:a16="http://schemas.microsoft.com/office/drawing/2014/main" id="{36EF7B41-29A2-8131-5D4A-B82D560F2D56}"/>
+              </a:ext>
+            </a:extLst>
+          </p:cNvPr>
+          <p:cNvSpPr txBox="1"/>
+          <p:nvPr/>
+        </p:nvSpPr>
+        <p:spPr>
+          <a:xfrm>
+            <a:off x="485273" y="5560017"/>
+            <a:ext cx="5278919" cy="695739"/>
+          </a:xfrm>
+          <a:prstGeom prst="rect">
+            <a:avLst/>
+          </a:prstGeom>
+          <a:solidFill>
+            <a:schemeClr val="accent4">
+              <a:lumMod val="20000"/>
+              <a:lumOff val="80000"/>
+            </a:schemeClr>
+          </a:solidFill>
+        </p:spPr>
+        <p:txBody>
+          <a:bodyPr wrap="square" rtlCol="0">
+            <a:noAutofit/>
+          </a:bodyPr>
+          <a:lstStyle/>
+          <a:p>
+            <a:r>
+              <a:rPr lang="de-DE" sz="1400" dirty="0">
+                <a:solidFill>
+                  <a:schemeClr val="tx1">
+                    <a:lumMod val="85000"/>
+                    <a:lumOff val="15000"/>
+                  </a:schemeClr>
+                </a:solidFill>
+              </a:rPr>
+              <a:t> </a:t>
+            </a:r>
+            <a:r>
+              <a:rPr lang="de-DE" sz="1400" dirty="0" err="1">
+                <a:solidFill>
+                  <a:schemeClr val="tx1">
+                    <a:lumMod val="85000"/>
+                    <a:lumOff val="15000"/>
+                  </a:schemeClr>
+                </a:solidFill>
+              </a:rPr>
+              <a:t>unknown</a:t>
+            </a:r>
+            <a:r>
+              <a:rPr lang="de-DE" sz="1400" dirty="0">
+                <a:solidFill>
+                  <a:schemeClr val="tx1">
+                    <a:lumMod val="85000"/>
+                    <a:lumOff val="15000"/>
+                  </a:schemeClr>
+                </a:solidFill>
+              </a:rPr>
+              <a:t> </a:t>
+            </a:r>
+            <a:r>
+              <a:rPr lang="de-DE" sz="1400" dirty="0" err="1">
+                <a:solidFill>
+                  <a:schemeClr val="tx1">
+                    <a:lumMod val="85000"/>
+                    <a:lumOff val="15000"/>
+                  </a:schemeClr>
+                </a:solidFill>
+              </a:rPr>
+              <a:t>user</a:t>
+            </a:r>
+            <a:r>
+              <a:rPr lang="de-DE" sz="1400" dirty="0">
+                <a:solidFill>
+                  <a:schemeClr val="tx1">
+                    <a:lumMod val="85000"/>
+                    <a:lumOff val="15000"/>
+                  </a:schemeClr>
+                </a:solidFill>
+              </a:rPr>
+              <a:t> </a:t>
+            </a:r>
+            <a:r>
+              <a:rPr lang="de-DE" sz="1400" dirty="0" err="1">
+                <a:solidFill>
+                  <a:schemeClr val="tx1">
+                    <a:lumMod val="85000"/>
+                    <a:lumOff val="15000"/>
+                  </a:schemeClr>
+                </a:solidFill>
+              </a:rPr>
+              <a:t>expectation</a:t>
+            </a:r>
+            <a:endParaRPr lang="de-DE" sz="1400" dirty="0">
+              <a:solidFill>
+                <a:schemeClr val="tx1">
+                  <a:lumMod val="85000"/>
+                  <a:lumOff val="15000"/>
+                </a:schemeClr>
+              </a:solidFill>
+            </a:endParaRPr>
+          </a:p>
+        </p:txBody>
+      </p:sp>
+      <p:sp>
+        <p:nvSpPr>
+          <p:cNvPr id="13" name="Textfeld 12">
+            <a:extLst>
+              <a:ext uri="{FF2B5EF4-FFF2-40B4-BE49-F238E27FC236}">
+                <a16:creationId xmlns:a16="http://schemas.microsoft.com/office/drawing/2014/main" id="{2888286A-1341-D222-C177-D531261DB175}"/>
+              </a:ext>
+            </a:extLst>
+          </p:cNvPr>
+          <p:cNvSpPr txBox="1"/>
+          <p:nvPr/>
+        </p:nvSpPr>
+        <p:spPr>
+          <a:xfrm>
+            <a:off x="6607790" y="294017"/>
+            <a:ext cx="2403863" cy="369332"/>
+          </a:xfrm>
+          <a:prstGeom prst="rect">
+            <a:avLst/>
+          </a:prstGeom>
+          <a:noFill/>
+        </p:spPr>
+        <p:txBody>
+          <a:bodyPr wrap="none" rtlCol="0">
+            <a:spAutoFit/>
+          </a:bodyPr>
+          <a:lstStyle/>
+          <a:p>
+            <a:r>
+              <a:rPr lang="de-DE" dirty="0"/>
+              <a:t>https://status.arc42.org</a:t>
+            </a:r>
+          </a:p>
+        </p:txBody>
+      </p:sp>
+      <p:sp>
+        <p:nvSpPr>
+          <p:cNvPr id="14" name="Textfeld 13">
+            <a:extLst>
+              <a:ext uri="{FF2B5EF4-FFF2-40B4-BE49-F238E27FC236}">
+                <a16:creationId xmlns:a16="http://schemas.microsoft.com/office/drawing/2014/main" id="{803124E7-372E-3A91-FF73-773BD58BCAF9}"/>
+              </a:ext>
+            </a:extLst>
+          </p:cNvPr>
+          <p:cNvSpPr txBox="1"/>
+          <p:nvPr/>
+        </p:nvSpPr>
+        <p:spPr>
+          <a:xfrm>
+            <a:off x="10854328" y="281372"/>
+            <a:ext cx="1118511" cy="369332"/>
+          </a:xfrm>
+          <a:prstGeom prst="rect">
+            <a:avLst/>
+          </a:prstGeom>
+          <a:noFill/>
+        </p:spPr>
+        <p:txBody>
+          <a:bodyPr wrap="none" rtlCol="0">
+            <a:spAutoFit/>
+          </a:bodyPr>
+          <a:lstStyle/>
+          <a:p>
+            <a:r>
+              <a:rPr lang="de-DE" dirty="0"/>
+              <a:t>Nov. 2023</a:t>
+            </a:r>
+          </a:p>
+        </p:txBody>
+      </p:sp>
+      <p:sp>
+        <p:nvSpPr>
+          <p:cNvPr id="15" name="Textfeld 14">
+            <a:extLst>
+              <a:ext uri="{FF2B5EF4-FFF2-40B4-BE49-F238E27FC236}">
+                <a16:creationId xmlns:a16="http://schemas.microsoft.com/office/drawing/2014/main" id="{9C09CFFB-972C-296F-11EE-70C8BC4C90B2}"/>
+              </a:ext>
+            </a:extLst>
+          </p:cNvPr>
+          <p:cNvSpPr txBox="1"/>
+          <p:nvPr/>
+        </p:nvSpPr>
+        <p:spPr>
+          <a:xfrm>
+            <a:off x="6200276" y="2735044"/>
+            <a:ext cx="2695072" cy="523220"/>
+          </a:xfrm>
+          <a:prstGeom prst="rect">
+            <a:avLst/>
+          </a:prstGeom>
+          <a:noFill/>
+        </p:spPr>
+        <p:txBody>
+          <a:bodyPr wrap="square" rtlCol="0">
+            <a:spAutoFit/>
+          </a:bodyPr>
+          <a:lstStyle/>
+          <a:p>
+            <a:pPr marL="285750" indent="-285750">
+              <a:buClr>
+                <a:srgbClr val="C00000"/>
+              </a:buClr>
+              <a:buSzPct val="120000"/>
+              <a:buFont typeface="Systemschrift Normal"/>
+              <a:buChar char="−"/>
+            </a:pPr>
+            <a:r>
+              <a:rPr lang="de-DE" sz="1400" dirty="0"/>
+              <a:t>just ONE slow </a:t>
+            </a:r>
+            <a:r>
+              <a:rPr lang="de-DE" sz="1400" dirty="0" err="1"/>
+              <a:t>request</a:t>
+            </a:r>
+            <a:r>
+              <a:rPr lang="de-DE" sz="1400" dirty="0"/>
+              <a:t> </a:t>
+            </a:r>
+            <a:r>
+              <a:rPr lang="de-DE" sz="1400" dirty="0" err="1"/>
+              <a:t>to</a:t>
+            </a:r>
+            <a:r>
+              <a:rPr lang="de-DE" sz="1400" dirty="0"/>
+              <a:t> </a:t>
+            </a:r>
+            <a:r>
+              <a:rPr lang="de-DE" sz="1400" dirty="0" err="1"/>
+              <a:t>create</a:t>
+            </a:r>
+            <a:r>
+              <a:rPr lang="de-DE" sz="1400" dirty="0"/>
+              <a:t> HTML </a:t>
+            </a:r>
+            <a:r>
+              <a:rPr lang="de-DE" sz="1400" dirty="0" err="1"/>
+              <a:t>table</a:t>
+            </a:r>
+            <a:r>
+              <a:rPr lang="de-DE" sz="1400" dirty="0"/>
+              <a:t> (&gt;3500ms) </a:t>
+            </a:r>
+          </a:p>
+        </p:txBody>
+      </p:sp>
+      <p:sp>
+        <p:nvSpPr>
+          <p:cNvPr id="2" name="Textfeld 1">
+            <a:extLst>
+              <a:ext uri="{FF2B5EF4-FFF2-40B4-BE49-F238E27FC236}">
+                <a16:creationId xmlns:a16="http://schemas.microsoft.com/office/drawing/2014/main" id="{5A145750-25CD-0FDC-BB62-7688E58ED681}"/>
+              </a:ext>
+            </a:extLst>
+          </p:cNvPr>
+          <p:cNvSpPr txBox="1"/>
+          <p:nvPr/>
+        </p:nvSpPr>
+        <p:spPr>
+          <a:xfrm>
+            <a:off x="1434790" y="3776546"/>
+            <a:ext cx="184731" cy="369332"/>
+          </a:xfrm>
+          <a:prstGeom prst="rect">
+            <a:avLst/>
+          </a:prstGeom>
+          <a:noFill/>
+        </p:spPr>
+        <p:txBody>
+          <a:bodyPr wrap="none" rtlCol="0">
+            <a:spAutoFit/>
+          </a:bodyPr>
+          <a:lstStyle/>
+          <a:p>
+            <a:endParaRPr lang="de-DE" dirty="0"/>
+          </a:p>
+        </p:txBody>
+      </p:sp>
+      <p:pic>
+        <p:nvPicPr>
+          <p:cNvPr id="18" name="Grafik 17">
+            <a:extLst>
+              <a:ext uri="{FF2B5EF4-FFF2-40B4-BE49-F238E27FC236}">
+                <a16:creationId xmlns:a16="http://schemas.microsoft.com/office/drawing/2014/main" id="{2D833687-ACCE-6CA6-4CA4-AB3F5F17B81E}"/>
+              </a:ext>
+            </a:extLst>
+          </p:cNvPr>
+          <p:cNvPicPr>
+            <a:picLocks noChangeAspect="1"/>
+          </p:cNvPicPr>
+          <p:nvPr/>
+        </p:nvPicPr>
+        <p:blipFill rotWithShape="1">
+          <a:blip r:embed="rId4"/>
+          <a:srcRect r="22010"/>
+          <a:stretch/>
+        </p:blipFill>
+        <p:spPr>
+          <a:xfrm>
+            <a:off x="2031576" y="3700326"/>
+            <a:ext cx="2997375" cy="1451125"/>
+          </a:xfrm>
+          <a:prstGeom prst="rect">
+            <a:avLst/>
+          </a:prstGeom>
+        </p:spPr>
+      </p:pic>
+      <p:sp>
+        <p:nvSpPr>
+          <p:cNvPr id="12" name="Textfeld 11">
+            <a:extLst>
+              <a:ext uri="{FF2B5EF4-FFF2-40B4-BE49-F238E27FC236}">
+                <a16:creationId xmlns:a16="http://schemas.microsoft.com/office/drawing/2014/main" id="{57004A93-A090-B363-FE52-BDD11B3D98F8}"/>
+              </a:ext>
+            </a:extLst>
+          </p:cNvPr>
+          <p:cNvSpPr txBox="1"/>
+          <p:nvPr/>
+        </p:nvSpPr>
+        <p:spPr>
+          <a:xfrm>
+            <a:off x="6129110" y="3605794"/>
+            <a:ext cx="2405744" cy="307777"/>
+          </a:xfrm>
+          <a:prstGeom prst="rect">
+            <a:avLst/>
+          </a:prstGeom>
+          <a:solidFill>
+            <a:schemeClr val="bg1"/>
+          </a:solidFill>
+        </p:spPr>
+        <p:txBody>
+          <a:bodyPr wrap="square" rtlCol="0">
+            <a:spAutoFit/>
+          </a:bodyPr>
+          <a:lstStyle/>
+          <a:p>
+            <a:r>
+              <a:rPr lang="en-US" sz="1400" dirty="0">
+                <a:solidFill>
+                  <a:schemeClr val="accent1">
+                    <a:lumMod val="75000"/>
+                  </a:schemeClr>
+                </a:solidFill>
+              </a:rPr>
+              <a:t>Components / Modules</a:t>
+            </a:r>
+          </a:p>
+        </p:txBody>
+      </p:sp>
+      <p:pic>
+        <p:nvPicPr>
+          <p:cNvPr id="16" name="Picture 14">
+            <a:extLst>
+              <a:ext uri="{FF2B5EF4-FFF2-40B4-BE49-F238E27FC236}">
+                <a16:creationId xmlns:a16="http://schemas.microsoft.com/office/drawing/2014/main" id="{469321EE-CB2A-70A0-D849-59A27AB5E2B8}"/>
+              </a:ext>
+            </a:extLst>
+          </p:cNvPr>
+          <p:cNvPicPr>
+            <a:picLocks noChangeAspect="1" noChangeArrowheads="1"/>
+          </p:cNvPicPr>
+          <p:nvPr/>
+        </p:nvPicPr>
+        <p:blipFill>
+          <a:blip r:embed="rId5">
+            <a:duotone>
+              <a:schemeClr val="accent1">
+                <a:shade val="45000"/>
+                <a:satMod val="135000"/>
+              </a:schemeClr>
+              <a:prstClr val="white"/>
+            </a:duotone>
+            <a:extLst>
+              <a:ext uri="{28A0092B-C50C-407E-A947-70E740481C1C}">
+                <a14:useLocalDpi xmlns:a14="http://schemas.microsoft.com/office/drawing/2010/main" val="0"/>
+              </a:ext>
+            </a:extLst>
+          </a:blip>
+          <a:srcRect/>
+          <a:stretch>
+            <a:fillRect/>
+          </a:stretch>
+        </p:blipFill>
+        <p:spPr bwMode="auto">
+          <a:xfrm>
+            <a:off x="11500506" y="3614166"/>
+            <a:ext cx="294729" cy="294729"/>
+          </a:xfrm>
+          <a:prstGeom prst="rect">
+            <a:avLst/>
+          </a:prstGeom>
+          <a:noFill/>
+          <a:extLst>
+            <a:ext uri="{909E8E84-426E-40DD-AFC4-6F175D3DCCD1}">
+              <a14:hiddenFill xmlns:a14="http://schemas.microsoft.com/office/drawing/2010/main">
+                <a:solidFill>
+                  <a:srgbClr val="FFFFFF"/>
+                </a:solidFill>
+              </a14:hiddenFill>
+            </a:ext>
+          </a:extLst>
+        </p:spPr>
+      </p:pic>
+      <p:sp>
+        <p:nvSpPr>
+          <p:cNvPr id="9" name="Textfeld 8">
+            <a:extLst>
+              <a:ext uri="{FF2B5EF4-FFF2-40B4-BE49-F238E27FC236}">
+                <a16:creationId xmlns:a16="http://schemas.microsoft.com/office/drawing/2014/main" id="{C16DB6D3-F34A-13A4-C7A9-8911B3EB43B7}"/>
+              </a:ext>
+            </a:extLst>
+          </p:cNvPr>
+          <p:cNvSpPr txBox="1"/>
+          <p:nvPr/>
+        </p:nvSpPr>
+        <p:spPr>
+          <a:xfrm rot="20108336">
+            <a:off x="2008566" y="2614669"/>
+            <a:ext cx="5317481" cy="1200329"/>
+          </a:xfrm>
+          <a:prstGeom prst="rect">
+            <a:avLst/>
+          </a:prstGeom>
+          <a:noFill/>
+        </p:spPr>
+        <p:txBody>
+          <a:bodyPr wrap="none" rtlCol="0">
+            <a:spAutoFit/>
+          </a:bodyPr>
+          <a:lstStyle/>
+          <a:p>
+            <a:r>
+              <a:rPr lang="de-DE" sz="7200" dirty="0" err="1">
+                <a:latin typeface="Mark Pro Book" panose="020B0604020201010104" pitchFamily="34" charset="77"/>
+              </a:rPr>
+              <a:t>deprecated</a:t>
+            </a:r>
+            <a:endParaRPr lang="de-DE" sz="7200" dirty="0">
+              <a:latin typeface="Mark Pro Book" panose="020B0604020201010104" pitchFamily="34" charset="77"/>
+            </a:endParaRPr>
+          </a:p>
+        </p:txBody>
+      </p:sp>
+    </p:spTree>
+    <p:extLst>
+      <p:ext uri="{BB962C8B-B14F-4D97-AF65-F5344CB8AC3E}">
+        <p14:creationId xmlns:p14="http://schemas.microsoft.com/office/powerpoint/2010/main" val="1742054003"/>
       </p:ext>
     </p:extLst>
   </p:cSld>

</xml_diff>